<commit_message>
Moved mo 3 to LG per tapdance.
</commit_message>
<xml_diff>
--- a/crkbd layout.pptx
+++ b/crkbd layout.pptx
@@ -264,7 +264,7 @@
           <a:p>
             <a:fld id="{69ADB622-6004-FC41-B12B-9423FD606E5F}" type="datetimeFigureOut">
               <a:rPr lang="en-DE" smtClean="0"/>
-              <a:t>14.03.23</a:t>
+              <a:t>21.03.23</a:t>
             </a:fld>
             <a:endParaRPr lang="en-DE"/>
           </a:p>
@@ -464,7 +464,7 @@
           <a:p>
             <a:fld id="{69ADB622-6004-FC41-B12B-9423FD606E5F}" type="datetimeFigureOut">
               <a:rPr lang="en-DE" smtClean="0"/>
-              <a:t>14.03.23</a:t>
+              <a:t>21.03.23</a:t>
             </a:fld>
             <a:endParaRPr lang="en-DE"/>
           </a:p>
@@ -674,7 +674,7 @@
           <a:p>
             <a:fld id="{69ADB622-6004-FC41-B12B-9423FD606E5F}" type="datetimeFigureOut">
               <a:rPr lang="en-DE" smtClean="0"/>
-              <a:t>14.03.23</a:t>
+              <a:t>21.03.23</a:t>
             </a:fld>
             <a:endParaRPr lang="en-DE"/>
           </a:p>
@@ -874,7 +874,7 @@
           <a:p>
             <a:fld id="{69ADB622-6004-FC41-B12B-9423FD606E5F}" type="datetimeFigureOut">
               <a:rPr lang="en-DE" smtClean="0"/>
-              <a:t>14.03.23</a:t>
+              <a:t>21.03.23</a:t>
             </a:fld>
             <a:endParaRPr lang="en-DE"/>
           </a:p>
@@ -1150,7 +1150,7 @@
           <a:p>
             <a:fld id="{69ADB622-6004-FC41-B12B-9423FD606E5F}" type="datetimeFigureOut">
               <a:rPr lang="en-DE" smtClean="0"/>
-              <a:t>14.03.23</a:t>
+              <a:t>21.03.23</a:t>
             </a:fld>
             <a:endParaRPr lang="en-DE"/>
           </a:p>
@@ -1418,7 +1418,7 @@
           <a:p>
             <a:fld id="{69ADB622-6004-FC41-B12B-9423FD606E5F}" type="datetimeFigureOut">
               <a:rPr lang="en-DE" smtClean="0"/>
-              <a:t>14.03.23</a:t>
+              <a:t>21.03.23</a:t>
             </a:fld>
             <a:endParaRPr lang="en-DE"/>
           </a:p>
@@ -1833,7 +1833,7 @@
           <a:p>
             <a:fld id="{69ADB622-6004-FC41-B12B-9423FD606E5F}" type="datetimeFigureOut">
               <a:rPr lang="en-DE" smtClean="0"/>
-              <a:t>14.03.23</a:t>
+              <a:t>21.03.23</a:t>
             </a:fld>
             <a:endParaRPr lang="en-DE"/>
           </a:p>
@@ -1975,7 +1975,7 @@
           <a:p>
             <a:fld id="{69ADB622-6004-FC41-B12B-9423FD606E5F}" type="datetimeFigureOut">
               <a:rPr lang="en-DE" smtClean="0"/>
-              <a:t>14.03.23</a:t>
+              <a:t>21.03.23</a:t>
             </a:fld>
             <a:endParaRPr lang="en-DE"/>
           </a:p>
@@ -2088,7 +2088,7 @@
           <a:p>
             <a:fld id="{69ADB622-6004-FC41-B12B-9423FD606E5F}" type="datetimeFigureOut">
               <a:rPr lang="en-DE" smtClean="0"/>
-              <a:t>14.03.23</a:t>
+              <a:t>21.03.23</a:t>
             </a:fld>
             <a:endParaRPr lang="en-DE"/>
           </a:p>
@@ -2401,7 +2401,7 @@
           <a:p>
             <a:fld id="{69ADB622-6004-FC41-B12B-9423FD606E5F}" type="datetimeFigureOut">
               <a:rPr lang="en-DE" smtClean="0"/>
-              <a:t>14.03.23</a:t>
+              <a:t>21.03.23</a:t>
             </a:fld>
             <a:endParaRPr lang="en-DE"/>
           </a:p>
@@ -2690,7 +2690,7 @@
           <a:p>
             <a:fld id="{69ADB622-6004-FC41-B12B-9423FD606E5F}" type="datetimeFigureOut">
               <a:rPr lang="en-DE" smtClean="0"/>
-              <a:t>14.03.23</a:t>
+              <a:t>21.03.23</a:t>
             </a:fld>
             <a:endParaRPr lang="en-DE"/>
           </a:p>
@@ -2933,7 +2933,7 @@
           <a:p>
             <a:fld id="{69ADB622-6004-FC41-B12B-9423FD606E5F}" type="datetimeFigureOut">
               <a:rPr lang="en-DE" smtClean="0"/>
-              <a:t>14.03.23</a:t>
+              <a:t>21.03.23</a:t>
             </a:fld>
             <a:endParaRPr lang="en-DE"/>
           </a:p>
@@ -4049,10 +4049,10 @@
             <a:r>
               <a:rPr lang="en-DE" sz="1500" dirty="0">
                 <a:solidFill>
-                  <a:schemeClr val="bg1"/>
-                </a:solidFill>
-              </a:rPr>
-              <a:t>LA</a:t>
+                  <a:schemeClr val="accent1"/>
+                </a:solidFill>
+              </a:rPr>
+              <a:t>3</a:t>
             </a:r>
           </a:p>
         </p:txBody>
@@ -4171,50 +4171,50 @@
             <a:r>
               <a:rPr lang="en-DE" sz="1500" dirty="0">
                 <a:solidFill>
+                  <a:schemeClr val="accent1"/>
+                </a:solidFill>
+              </a:rPr>
+              <a:t>3</a:t>
+            </a:r>
+          </a:p>
+        </p:txBody>
+      </p:sp>
+      <p:sp>
+        <p:nvSpPr>
+          <p:cNvPr id="40" name="TextBox 39">
+            <a:extLst>
+              <a:ext uri="{FF2B5EF4-FFF2-40B4-BE49-F238E27FC236}">
+                <a16:creationId xmlns:a16="http://schemas.microsoft.com/office/drawing/2014/main" id="{A7EB99A4-0CF5-4302-F13E-B3CB71D4BDF6}"/>
+              </a:ext>
+            </a:extLst>
+          </p:cNvPr>
+          <p:cNvSpPr txBox="1"/>
+          <p:nvPr/>
+        </p:nvSpPr>
+        <p:spPr>
+          <a:xfrm>
+            <a:off x="8702425" y="4074351"/>
+            <a:ext cx="640611" cy="523220"/>
+          </a:xfrm>
+          <a:prstGeom prst="rect">
+            <a:avLst/>
+          </a:prstGeom>
+          <a:noFill/>
+        </p:spPr>
+        <p:txBody>
+          <a:bodyPr wrap="square" rtlCol="0">
+            <a:spAutoFit/>
+          </a:bodyPr>
+          <a:lstStyle/>
+          <a:p>
+            <a:pPr algn="ctr"/>
+            <a:r>
+              <a:rPr lang="en-DE" sz="2800" dirty="0">
+                <a:solidFill>
                   <a:schemeClr val="bg1"/>
                 </a:solidFill>
               </a:rPr>
-              <a:t>LA</a:t>
-            </a:r>
-          </a:p>
-        </p:txBody>
-      </p:sp>
-      <p:sp>
-        <p:nvSpPr>
-          <p:cNvPr id="40" name="TextBox 39">
-            <a:extLst>
-              <a:ext uri="{FF2B5EF4-FFF2-40B4-BE49-F238E27FC236}">
-                <a16:creationId xmlns:a16="http://schemas.microsoft.com/office/drawing/2014/main" id="{A7EB99A4-0CF5-4302-F13E-B3CB71D4BDF6}"/>
-              </a:ext>
-            </a:extLst>
-          </p:cNvPr>
-          <p:cNvSpPr txBox="1"/>
-          <p:nvPr/>
-        </p:nvSpPr>
-        <p:spPr>
-          <a:xfrm>
-            <a:off x="8791256" y="4063811"/>
-            <a:ext cx="465285" cy="523220"/>
-          </a:xfrm>
-          <a:prstGeom prst="rect">
-            <a:avLst/>
-          </a:prstGeom>
-          <a:noFill/>
-        </p:spPr>
-        <p:txBody>
-          <a:bodyPr wrap="square" rtlCol="0">
-            <a:spAutoFit/>
-          </a:bodyPr>
-          <a:lstStyle/>
-          <a:p>
-            <a:pPr algn="ctr"/>
-            <a:r>
-              <a:rPr lang="en-DE" sz="2800" dirty="0">
-                <a:solidFill>
-                  <a:srgbClr val="0070C0"/>
-                </a:solidFill>
-              </a:rPr>
-              <a:t>3</a:t>
+              <a:t>RA</a:t>
             </a:r>
           </a:p>
         </p:txBody>

</xml_diff>

<commit_message>
Moved Magnet stuff around, alligned ALL brackets to be C4 and C5.
</commit_message>
<xml_diff>
--- a/crkbd layout.pptx
+++ b/crkbd layout.pptx
@@ -264,7 +264,7 @@
           <a:p>
             <a:fld id="{69ADB622-6004-FC41-B12B-9423FD606E5F}" type="datetimeFigureOut">
               <a:rPr lang="en-DE" smtClean="0"/>
-              <a:t>21.03.23</a:t>
+              <a:t>22.03.23</a:t>
             </a:fld>
             <a:endParaRPr lang="en-DE"/>
           </a:p>
@@ -464,7 +464,7 @@
           <a:p>
             <a:fld id="{69ADB622-6004-FC41-B12B-9423FD606E5F}" type="datetimeFigureOut">
               <a:rPr lang="en-DE" smtClean="0"/>
-              <a:t>21.03.23</a:t>
+              <a:t>22.03.23</a:t>
             </a:fld>
             <a:endParaRPr lang="en-DE"/>
           </a:p>
@@ -674,7 +674,7 @@
           <a:p>
             <a:fld id="{69ADB622-6004-FC41-B12B-9423FD606E5F}" type="datetimeFigureOut">
               <a:rPr lang="en-DE" smtClean="0"/>
-              <a:t>21.03.23</a:t>
+              <a:t>22.03.23</a:t>
             </a:fld>
             <a:endParaRPr lang="en-DE"/>
           </a:p>
@@ -874,7 +874,7 @@
           <a:p>
             <a:fld id="{69ADB622-6004-FC41-B12B-9423FD606E5F}" type="datetimeFigureOut">
               <a:rPr lang="en-DE" smtClean="0"/>
-              <a:t>21.03.23</a:t>
+              <a:t>22.03.23</a:t>
             </a:fld>
             <a:endParaRPr lang="en-DE"/>
           </a:p>
@@ -1150,7 +1150,7 @@
           <a:p>
             <a:fld id="{69ADB622-6004-FC41-B12B-9423FD606E5F}" type="datetimeFigureOut">
               <a:rPr lang="en-DE" smtClean="0"/>
-              <a:t>21.03.23</a:t>
+              <a:t>22.03.23</a:t>
             </a:fld>
             <a:endParaRPr lang="en-DE"/>
           </a:p>
@@ -1418,7 +1418,7 @@
           <a:p>
             <a:fld id="{69ADB622-6004-FC41-B12B-9423FD606E5F}" type="datetimeFigureOut">
               <a:rPr lang="en-DE" smtClean="0"/>
-              <a:t>21.03.23</a:t>
+              <a:t>22.03.23</a:t>
             </a:fld>
             <a:endParaRPr lang="en-DE"/>
           </a:p>
@@ -1833,7 +1833,7 @@
           <a:p>
             <a:fld id="{69ADB622-6004-FC41-B12B-9423FD606E5F}" type="datetimeFigureOut">
               <a:rPr lang="en-DE" smtClean="0"/>
-              <a:t>21.03.23</a:t>
+              <a:t>22.03.23</a:t>
             </a:fld>
             <a:endParaRPr lang="en-DE"/>
           </a:p>
@@ -1975,7 +1975,7 @@
           <a:p>
             <a:fld id="{69ADB622-6004-FC41-B12B-9423FD606E5F}" type="datetimeFigureOut">
               <a:rPr lang="en-DE" smtClean="0"/>
-              <a:t>21.03.23</a:t>
+              <a:t>22.03.23</a:t>
             </a:fld>
             <a:endParaRPr lang="en-DE"/>
           </a:p>
@@ -2088,7 +2088,7 @@
           <a:p>
             <a:fld id="{69ADB622-6004-FC41-B12B-9423FD606E5F}" type="datetimeFigureOut">
               <a:rPr lang="en-DE" smtClean="0"/>
-              <a:t>21.03.23</a:t>
+              <a:t>22.03.23</a:t>
             </a:fld>
             <a:endParaRPr lang="en-DE"/>
           </a:p>
@@ -2401,7 +2401,7 @@
           <a:p>
             <a:fld id="{69ADB622-6004-FC41-B12B-9423FD606E5F}" type="datetimeFigureOut">
               <a:rPr lang="en-DE" smtClean="0"/>
-              <a:t>21.03.23</a:t>
+              <a:t>22.03.23</a:t>
             </a:fld>
             <a:endParaRPr lang="en-DE"/>
           </a:p>
@@ -2690,7 +2690,7 @@
           <a:p>
             <a:fld id="{69ADB622-6004-FC41-B12B-9423FD606E5F}" type="datetimeFigureOut">
               <a:rPr lang="en-DE" smtClean="0"/>
-              <a:t>21.03.23</a:t>
+              <a:t>22.03.23</a:t>
             </a:fld>
             <a:endParaRPr lang="en-DE"/>
           </a:p>
@@ -2933,7 +2933,7 @@
           <a:p>
             <a:fld id="{69ADB622-6004-FC41-B12B-9423FD606E5F}" type="datetimeFigureOut">
               <a:rPr lang="en-DE" smtClean="0"/>
-              <a:t>21.03.23</a:t>
+              <a:t>22.03.23</a:t>
             </a:fld>
             <a:endParaRPr lang="en-DE"/>
           </a:p>
@@ -8024,7 +8024,7 @@
                   </a:schemeClr>
                 </a:solidFill>
               </a:rPr>
-              <a:t>[</a:t>
+              <a:t>\</a:t>
             </a:r>
           </a:p>
         </p:txBody>
@@ -8066,7 +8066,7 @@
                   </a:schemeClr>
                 </a:solidFill>
               </a:rPr>
-              <a:t>{</a:t>
+              <a:t>\</a:t>
             </a:r>
           </a:p>
         </p:txBody>
@@ -8150,7 +8150,7 @@
                   </a:schemeClr>
                 </a:solidFill>
               </a:rPr>
-              <a:t>]</a:t>
+              <a:t>[</a:t>
             </a:r>
           </a:p>
         </p:txBody>
@@ -8192,7 +8192,7 @@
                   </a:schemeClr>
                 </a:solidFill>
               </a:rPr>
-              <a:t>}</a:t>
+              <a:t>[</a:t>
             </a:r>
           </a:p>
         </p:txBody>
@@ -8276,7 +8276,7 @@
                   </a:schemeClr>
                 </a:solidFill>
               </a:rPr>
-              <a:t>\</a:t>
+              <a:t>]</a:t>
             </a:r>
           </a:p>
         </p:txBody>
@@ -8318,7 +8318,7 @@
                   </a:schemeClr>
                 </a:solidFill>
               </a:rPr>
-              <a:t>|</a:t>
+              <a:t>]</a:t>
             </a:r>
           </a:p>
         </p:txBody>
@@ -9200,7 +9200,7 @@
         </p:nvSpPr>
         <p:spPr>
           <a:xfrm>
-            <a:off x="8228505" y="1394966"/>
+            <a:off x="8990448" y="1323454"/>
             <a:ext cx="829548" cy="553998"/>
           </a:xfrm>
           <a:prstGeom prst="rect">
@@ -9575,7 +9575,7 @@
         </p:nvSpPr>
         <p:spPr>
           <a:xfrm>
-            <a:off x="8974630" y="1312416"/>
+            <a:off x="9785219" y="1423425"/>
             <a:ext cx="829548" cy="553998"/>
           </a:xfrm>
           <a:prstGeom prst="rect">
@@ -9615,7 +9615,7 @@
         </p:nvSpPr>
         <p:spPr>
           <a:xfrm>
-            <a:off x="8234855" y="2268091"/>
+            <a:off x="8990448" y="2156704"/>
             <a:ext cx="829548" cy="553998"/>
           </a:xfrm>
           <a:prstGeom prst="rect">
@@ -9655,7 +9655,7 @@
         </p:nvSpPr>
         <p:spPr>
           <a:xfrm>
-            <a:off x="9003205" y="2169666"/>
+            <a:off x="9719794" y="2221699"/>
             <a:ext cx="829548" cy="553998"/>
           </a:xfrm>
           <a:prstGeom prst="rect">
@@ -9695,7 +9695,7 @@
         </p:nvSpPr>
         <p:spPr>
           <a:xfrm>
-            <a:off x="8222155" y="3131691"/>
+            <a:off x="8213429" y="2252876"/>
             <a:ext cx="829548" cy="553998"/>
           </a:xfrm>
           <a:prstGeom prst="rect">
@@ -9735,7 +9735,7 @@
         </p:nvSpPr>
         <p:spPr>
           <a:xfrm>
-            <a:off x="8968280" y="3011041"/>
+            <a:off x="10513839" y="2452931"/>
             <a:ext cx="829548" cy="553998"/>
           </a:xfrm>
           <a:prstGeom prst="rect">
@@ -9775,8 +9775,8 @@
         </p:nvSpPr>
         <p:spPr>
           <a:xfrm>
-            <a:off x="8143794" y="1232417"/>
-            <a:ext cx="3993639" cy="2532563"/>
+            <a:off x="8143795" y="1232417"/>
+            <a:ext cx="3944554" cy="1885957"/>
           </a:xfrm>
           <a:prstGeom prst="rect">
             <a:avLst/>

</xml_diff>

<commit_message>
Added Volume Control to Func layer. Updated Vis.
</commit_message>
<xml_diff>
--- a/crkbd layout.pptx
+++ b/crkbd layout.pptx
@@ -264,7 +264,7 @@
           <a:p>
             <a:fld id="{69ADB622-6004-FC41-B12B-9423FD606E5F}" type="datetimeFigureOut">
               <a:rPr lang="en-DE" smtClean="0"/>
-              <a:t>22.03.23</a:t>
+              <a:t>24.03.23</a:t>
             </a:fld>
             <a:endParaRPr lang="en-DE"/>
           </a:p>
@@ -464,7 +464,7 @@
           <a:p>
             <a:fld id="{69ADB622-6004-FC41-B12B-9423FD606E5F}" type="datetimeFigureOut">
               <a:rPr lang="en-DE" smtClean="0"/>
-              <a:t>22.03.23</a:t>
+              <a:t>24.03.23</a:t>
             </a:fld>
             <a:endParaRPr lang="en-DE"/>
           </a:p>
@@ -674,7 +674,7 @@
           <a:p>
             <a:fld id="{69ADB622-6004-FC41-B12B-9423FD606E5F}" type="datetimeFigureOut">
               <a:rPr lang="en-DE" smtClean="0"/>
-              <a:t>22.03.23</a:t>
+              <a:t>24.03.23</a:t>
             </a:fld>
             <a:endParaRPr lang="en-DE"/>
           </a:p>
@@ -874,7 +874,7 @@
           <a:p>
             <a:fld id="{69ADB622-6004-FC41-B12B-9423FD606E5F}" type="datetimeFigureOut">
               <a:rPr lang="en-DE" smtClean="0"/>
-              <a:t>22.03.23</a:t>
+              <a:t>24.03.23</a:t>
             </a:fld>
             <a:endParaRPr lang="en-DE"/>
           </a:p>
@@ -1150,7 +1150,7 @@
           <a:p>
             <a:fld id="{69ADB622-6004-FC41-B12B-9423FD606E5F}" type="datetimeFigureOut">
               <a:rPr lang="en-DE" smtClean="0"/>
-              <a:t>22.03.23</a:t>
+              <a:t>24.03.23</a:t>
             </a:fld>
             <a:endParaRPr lang="en-DE"/>
           </a:p>
@@ -1418,7 +1418,7 @@
           <a:p>
             <a:fld id="{69ADB622-6004-FC41-B12B-9423FD606E5F}" type="datetimeFigureOut">
               <a:rPr lang="en-DE" smtClean="0"/>
-              <a:t>22.03.23</a:t>
+              <a:t>24.03.23</a:t>
             </a:fld>
             <a:endParaRPr lang="en-DE"/>
           </a:p>
@@ -1833,7 +1833,7 @@
           <a:p>
             <a:fld id="{69ADB622-6004-FC41-B12B-9423FD606E5F}" type="datetimeFigureOut">
               <a:rPr lang="en-DE" smtClean="0"/>
-              <a:t>22.03.23</a:t>
+              <a:t>24.03.23</a:t>
             </a:fld>
             <a:endParaRPr lang="en-DE"/>
           </a:p>
@@ -1975,7 +1975,7 @@
           <a:p>
             <a:fld id="{69ADB622-6004-FC41-B12B-9423FD606E5F}" type="datetimeFigureOut">
               <a:rPr lang="en-DE" smtClean="0"/>
-              <a:t>22.03.23</a:t>
+              <a:t>24.03.23</a:t>
             </a:fld>
             <a:endParaRPr lang="en-DE"/>
           </a:p>
@@ -2088,7 +2088,7 @@
           <a:p>
             <a:fld id="{69ADB622-6004-FC41-B12B-9423FD606E5F}" type="datetimeFigureOut">
               <a:rPr lang="en-DE" smtClean="0"/>
-              <a:t>22.03.23</a:t>
+              <a:t>24.03.23</a:t>
             </a:fld>
             <a:endParaRPr lang="en-DE"/>
           </a:p>
@@ -2401,7 +2401,7 @@
           <a:p>
             <a:fld id="{69ADB622-6004-FC41-B12B-9423FD606E5F}" type="datetimeFigureOut">
               <a:rPr lang="en-DE" smtClean="0"/>
-              <a:t>22.03.23</a:t>
+              <a:t>24.03.23</a:t>
             </a:fld>
             <a:endParaRPr lang="en-DE"/>
           </a:p>
@@ -2690,7 +2690,7 @@
           <a:p>
             <a:fld id="{69ADB622-6004-FC41-B12B-9423FD606E5F}" type="datetimeFigureOut">
               <a:rPr lang="en-DE" smtClean="0"/>
-              <a:t>22.03.23</a:t>
+              <a:t>24.03.23</a:t>
             </a:fld>
             <a:endParaRPr lang="en-DE"/>
           </a:p>
@@ -2933,7 +2933,7 @@
           <a:p>
             <a:fld id="{69ADB622-6004-FC41-B12B-9423FD606E5F}" type="datetimeFigureOut">
               <a:rPr lang="en-DE" smtClean="0"/>
-              <a:t>22.03.23</a:t>
+              <a:t>24.03.23</a:t>
             </a:fld>
             <a:endParaRPr lang="en-DE"/>
           </a:p>
@@ -3951,23 +3951,23 @@
         </p:nvSpPr>
         <p:spPr>
           <a:xfrm>
-            <a:off x="104930" y="3392929"/>
-            <a:ext cx="639947" cy="400110"/>
-          </a:xfrm>
-          <a:prstGeom prst="rect">
-            <a:avLst/>
-          </a:prstGeom>
-          <a:noFill/>
-        </p:spPr>
-        <p:txBody>
-          <a:bodyPr wrap="square" rtlCol="0">
-            <a:spAutoFit/>
-          </a:bodyPr>
-          <a:lstStyle/>
-          <a:p>
-            <a:pPr algn="ctr"/>
-            <a:r>
-              <a:rPr lang="en-DE" sz="2000" dirty="0">
+            <a:off x="14477" y="3199533"/>
+            <a:ext cx="639947" cy="523220"/>
+          </a:xfrm>
+          <a:prstGeom prst="rect">
+            <a:avLst/>
+          </a:prstGeom>
+          <a:noFill/>
+        </p:spPr>
+        <p:txBody>
+          <a:bodyPr wrap="square" rtlCol="0">
+            <a:spAutoFit/>
+          </a:bodyPr>
+          <a:lstStyle/>
+          <a:p>
+            <a:pPr algn="ctr"/>
+            <a:r>
+              <a:rPr lang="en-DE" sz="2800" dirty="0">
                 <a:solidFill>
                   <a:schemeClr val="bg1"/>
                 </a:solidFill>
@@ -5655,6 +5655,46 @@
                 </a:solidFill>
               </a:rPr>
               <a:t>V</a:t>
+            </a:r>
+          </a:p>
+        </p:txBody>
+      </p:sp>
+      <p:sp>
+        <p:nvSpPr>
+          <p:cNvPr id="2" name="TextBox 1">
+            <a:extLst>
+              <a:ext uri="{FF2B5EF4-FFF2-40B4-BE49-F238E27FC236}">
+                <a16:creationId xmlns:a16="http://schemas.microsoft.com/office/drawing/2014/main" id="{C7100A22-7611-BBC8-89BA-55FD05E61D31}"/>
+              </a:ext>
+            </a:extLst>
+          </p:cNvPr>
+          <p:cNvSpPr txBox="1"/>
+          <p:nvPr/>
+        </p:nvSpPr>
+        <p:spPr>
+          <a:xfrm>
+            <a:off x="242571" y="3609460"/>
+            <a:ext cx="639947" cy="323165"/>
+          </a:xfrm>
+          <a:prstGeom prst="rect">
+            <a:avLst/>
+          </a:prstGeom>
+          <a:noFill/>
+        </p:spPr>
+        <p:txBody>
+          <a:bodyPr wrap="square" rtlCol="0">
+            <a:spAutoFit/>
+          </a:bodyPr>
+          <a:lstStyle/>
+          <a:p>
+            <a:pPr algn="ctr"/>
+            <a:r>
+              <a:rPr lang="en-DE" sz="1500" dirty="0">
+                <a:solidFill>
+                  <a:schemeClr val="bg1"/>
+                </a:solidFill>
+              </a:rPr>
+              <a:t>RA</a:t>
             </a:r>
           </a:p>
         </p:txBody>
@@ -8745,7 +8785,7 @@
         </p:nvSpPr>
         <p:spPr>
           <a:xfrm>
-            <a:off x="-739085" y="-17770"/>
+            <a:off x="-664630" y="0"/>
             <a:ext cx="13023352" cy="7565501"/>
           </a:xfrm>
           <a:prstGeom prst="rect">
@@ -9810,6 +9850,86 @@
           <a:p>
             <a:pPr algn="ctr"/>
             <a:endParaRPr lang="en-DE"/>
+          </a:p>
+        </p:txBody>
+      </p:sp>
+      <p:sp>
+        <p:nvSpPr>
+          <p:cNvPr id="2" name="TextBox 1">
+            <a:extLst>
+              <a:ext uri="{FF2B5EF4-FFF2-40B4-BE49-F238E27FC236}">
+                <a16:creationId xmlns:a16="http://schemas.microsoft.com/office/drawing/2014/main" id="{8E8E7539-7CE9-0B7B-0117-9C2DFBDA30B2}"/>
+              </a:ext>
+            </a:extLst>
+          </p:cNvPr>
+          <p:cNvSpPr txBox="1"/>
+          <p:nvPr/>
+        </p:nvSpPr>
+        <p:spPr>
+          <a:xfrm>
+            <a:off x="2457133" y="3088228"/>
+            <a:ext cx="639947" cy="400110"/>
+          </a:xfrm>
+          <a:prstGeom prst="rect">
+            <a:avLst/>
+          </a:prstGeom>
+          <a:noFill/>
+        </p:spPr>
+        <p:txBody>
+          <a:bodyPr wrap="square" rtlCol="0">
+            <a:spAutoFit/>
+          </a:bodyPr>
+          <a:lstStyle/>
+          <a:p>
+            <a:pPr algn="ctr"/>
+            <a:r>
+              <a:rPr lang="en-DE" sz="2000" dirty="0">
+                <a:solidFill>
+                  <a:srgbClr val="0070C0"/>
+                </a:solidFill>
+              </a:rPr>
+              <a:t>Vol-</a:t>
+            </a:r>
+          </a:p>
+        </p:txBody>
+      </p:sp>
+      <p:sp>
+        <p:nvSpPr>
+          <p:cNvPr id="12" name="TextBox 11">
+            <a:extLst>
+              <a:ext uri="{FF2B5EF4-FFF2-40B4-BE49-F238E27FC236}">
+                <a16:creationId xmlns:a16="http://schemas.microsoft.com/office/drawing/2014/main" id="{C642AB53-CD3E-599C-12F6-AC5257FE7850}"/>
+              </a:ext>
+            </a:extLst>
+          </p:cNvPr>
+          <p:cNvSpPr txBox="1"/>
+          <p:nvPr/>
+        </p:nvSpPr>
+        <p:spPr>
+          <a:xfrm>
+            <a:off x="3236066" y="3164428"/>
+            <a:ext cx="639947" cy="400110"/>
+          </a:xfrm>
+          <a:prstGeom prst="rect">
+            <a:avLst/>
+          </a:prstGeom>
+          <a:noFill/>
+        </p:spPr>
+        <p:txBody>
+          <a:bodyPr wrap="square" rtlCol="0">
+            <a:spAutoFit/>
+          </a:bodyPr>
+          <a:lstStyle/>
+          <a:p>
+            <a:pPr algn="ctr"/>
+            <a:r>
+              <a:rPr lang="en-DE" sz="2000" dirty="0">
+                <a:solidFill>
+                  <a:srgbClr val="0070C0"/>
+                </a:solidFill>
+              </a:rPr>
+              <a:t>Vol+</a:t>
+            </a:r>
           </a:p>
         </p:txBody>
       </p:sp>

</xml_diff>

<commit_message>
Fixed typo in vis.
</commit_message>
<xml_diff>
--- a/crkbd layout.pptx
+++ b/crkbd layout.pptx
@@ -264,7 +264,7 @@
           <a:p>
             <a:fld id="{69ADB622-6004-FC41-B12B-9423FD606E5F}" type="datetimeFigureOut">
               <a:rPr lang="en-DE" smtClean="0"/>
-              <a:t>24.03.23</a:t>
+              <a:t>28.03.23</a:t>
             </a:fld>
             <a:endParaRPr lang="en-DE"/>
           </a:p>
@@ -464,7 +464,7 @@
           <a:p>
             <a:fld id="{69ADB622-6004-FC41-B12B-9423FD606E5F}" type="datetimeFigureOut">
               <a:rPr lang="en-DE" smtClean="0"/>
-              <a:t>24.03.23</a:t>
+              <a:t>28.03.23</a:t>
             </a:fld>
             <a:endParaRPr lang="en-DE"/>
           </a:p>
@@ -674,7 +674,7 @@
           <a:p>
             <a:fld id="{69ADB622-6004-FC41-B12B-9423FD606E5F}" type="datetimeFigureOut">
               <a:rPr lang="en-DE" smtClean="0"/>
-              <a:t>24.03.23</a:t>
+              <a:t>28.03.23</a:t>
             </a:fld>
             <a:endParaRPr lang="en-DE"/>
           </a:p>
@@ -874,7 +874,7 @@
           <a:p>
             <a:fld id="{69ADB622-6004-FC41-B12B-9423FD606E5F}" type="datetimeFigureOut">
               <a:rPr lang="en-DE" smtClean="0"/>
-              <a:t>24.03.23</a:t>
+              <a:t>28.03.23</a:t>
             </a:fld>
             <a:endParaRPr lang="en-DE"/>
           </a:p>
@@ -1150,7 +1150,7 @@
           <a:p>
             <a:fld id="{69ADB622-6004-FC41-B12B-9423FD606E5F}" type="datetimeFigureOut">
               <a:rPr lang="en-DE" smtClean="0"/>
-              <a:t>24.03.23</a:t>
+              <a:t>28.03.23</a:t>
             </a:fld>
             <a:endParaRPr lang="en-DE"/>
           </a:p>
@@ -1418,7 +1418,7 @@
           <a:p>
             <a:fld id="{69ADB622-6004-FC41-B12B-9423FD606E5F}" type="datetimeFigureOut">
               <a:rPr lang="en-DE" smtClean="0"/>
-              <a:t>24.03.23</a:t>
+              <a:t>28.03.23</a:t>
             </a:fld>
             <a:endParaRPr lang="en-DE"/>
           </a:p>
@@ -1833,7 +1833,7 @@
           <a:p>
             <a:fld id="{69ADB622-6004-FC41-B12B-9423FD606E5F}" type="datetimeFigureOut">
               <a:rPr lang="en-DE" smtClean="0"/>
-              <a:t>24.03.23</a:t>
+              <a:t>28.03.23</a:t>
             </a:fld>
             <a:endParaRPr lang="en-DE"/>
           </a:p>
@@ -1975,7 +1975,7 @@
           <a:p>
             <a:fld id="{69ADB622-6004-FC41-B12B-9423FD606E5F}" type="datetimeFigureOut">
               <a:rPr lang="en-DE" smtClean="0"/>
-              <a:t>24.03.23</a:t>
+              <a:t>28.03.23</a:t>
             </a:fld>
             <a:endParaRPr lang="en-DE"/>
           </a:p>
@@ -2088,7 +2088,7 @@
           <a:p>
             <a:fld id="{69ADB622-6004-FC41-B12B-9423FD606E5F}" type="datetimeFigureOut">
               <a:rPr lang="en-DE" smtClean="0"/>
-              <a:t>24.03.23</a:t>
+              <a:t>28.03.23</a:t>
             </a:fld>
             <a:endParaRPr lang="en-DE"/>
           </a:p>
@@ -2401,7 +2401,7 @@
           <a:p>
             <a:fld id="{69ADB622-6004-FC41-B12B-9423FD606E5F}" type="datetimeFigureOut">
               <a:rPr lang="en-DE" smtClean="0"/>
-              <a:t>24.03.23</a:t>
+              <a:t>28.03.23</a:t>
             </a:fld>
             <a:endParaRPr lang="en-DE"/>
           </a:p>
@@ -2690,7 +2690,7 @@
           <a:p>
             <a:fld id="{69ADB622-6004-FC41-B12B-9423FD606E5F}" type="datetimeFigureOut">
               <a:rPr lang="en-DE" smtClean="0"/>
-              <a:t>24.03.23</a:t>
+              <a:t>28.03.23</a:t>
             </a:fld>
             <a:endParaRPr lang="en-DE"/>
           </a:p>
@@ -2933,7 +2933,7 @@
           <a:p>
             <a:fld id="{69ADB622-6004-FC41-B12B-9423FD606E5F}" type="datetimeFigureOut">
               <a:rPr lang="en-DE" smtClean="0"/>
-              <a:t>24.03.23</a:t>
+              <a:t>28.03.23</a:t>
             </a:fld>
             <a:endParaRPr lang="en-DE"/>
           </a:p>
@@ -8099,15 +8099,22 @@
           <a:p>
             <a:pPr algn="ctr"/>
             <a:r>
-              <a:rPr lang="en-DE" sz="2800" dirty="0">
+              <a:rPr lang="en-DE" sz="2800">
                 <a:solidFill>
                   <a:schemeClr val="accent2">
                     <a:lumMod val="75000"/>
                   </a:schemeClr>
                 </a:solidFill>
               </a:rPr>
-              <a:t>\</a:t>
-            </a:r>
+              <a:t>|</a:t>
+            </a:r>
+            <a:endParaRPr lang="en-DE" sz="2800" dirty="0">
+              <a:solidFill>
+                <a:schemeClr val="accent2">
+                  <a:lumMod val="75000"/>
+                </a:schemeClr>
+              </a:solidFill>
+            </a:endParaRPr>
           </a:p>
         </p:txBody>
       </p:sp>

</xml_diff>

<commit_message>
Added Short Screenshot to file.
</commit_message>
<xml_diff>
--- a/crkbd layout.pptx
+++ b/crkbd layout.pptx
@@ -6988,39 +6988,90 @@
         </p:nvSpPr>
         <p:spPr>
           <a:xfrm>
-            <a:off x="3257398" y="3042552"/>
-            <a:ext cx="616241" cy="707886"/>
-          </a:xfrm>
-          <a:prstGeom prst="rect">
-            <a:avLst/>
-          </a:prstGeom>
-          <a:noFill/>
-        </p:spPr>
-        <p:txBody>
-          <a:bodyPr wrap="square" rtlCol="0">
-            <a:spAutoFit/>
-          </a:bodyPr>
-          <a:lstStyle/>
-          <a:p>
-            <a:pPr algn="ctr"/>
-            <a:r>
-              <a:rPr lang="en-DE" sz="2000" dirty="0">
+            <a:off x="3254744" y="3104252"/>
+            <a:ext cx="616241" cy="553998"/>
+          </a:xfrm>
+          <a:prstGeom prst="rect">
+            <a:avLst/>
+          </a:prstGeom>
+          <a:noFill/>
+        </p:spPr>
+        <p:txBody>
+          <a:bodyPr wrap="square" rtlCol="0">
+            <a:spAutoFit/>
+          </a:bodyPr>
+          <a:lstStyle/>
+          <a:p>
+            <a:pPr algn="ctr"/>
+            <a:r>
+              <a:rPr lang="en-DE" sz="1500" dirty="0">
                 <a:solidFill>
                   <a:schemeClr val="accent6"/>
                 </a:solidFill>
               </a:rPr>
-              <a:t>Sc</a:t>
-            </a:r>
-          </a:p>
-          <a:p>
-            <a:pPr algn="ctr"/>
-            <a:r>
-              <a:rPr lang="en-DE" sz="2000" dirty="0">
+              <a:t>ScSh</a:t>
+            </a:r>
+          </a:p>
+          <a:p>
+            <a:pPr algn="ctr"/>
+            <a:r>
+              <a:rPr lang="en-DE" sz="1500" dirty="0">
                 <a:solidFill>
                   <a:schemeClr val="accent6"/>
                 </a:solidFill>
               </a:rPr>
-              <a:t>Sh</a:t>
+              <a:t>Cp</a:t>
+            </a:r>
+          </a:p>
+        </p:txBody>
+      </p:sp>
+      <p:sp>
+        <p:nvSpPr>
+          <p:cNvPr id="7" name="TextBox 6">
+            <a:extLst>
+              <a:ext uri="{FF2B5EF4-FFF2-40B4-BE49-F238E27FC236}">
+                <a16:creationId xmlns:a16="http://schemas.microsoft.com/office/drawing/2014/main" id="{32B357FA-DC86-525D-1D89-BFDF77E9E164}"/>
+              </a:ext>
+            </a:extLst>
+          </p:cNvPr>
+          <p:cNvSpPr txBox="1"/>
+          <p:nvPr/>
+        </p:nvSpPr>
+        <p:spPr>
+          <a:xfrm>
+            <a:off x="2462775" y="3070488"/>
+            <a:ext cx="616241" cy="553998"/>
+          </a:xfrm>
+          <a:prstGeom prst="rect">
+            <a:avLst/>
+          </a:prstGeom>
+          <a:noFill/>
+        </p:spPr>
+        <p:txBody>
+          <a:bodyPr wrap="square" rtlCol="0">
+            <a:spAutoFit/>
+          </a:bodyPr>
+          <a:lstStyle/>
+          <a:p>
+            <a:pPr algn="ctr"/>
+            <a:r>
+              <a:rPr lang="en-DE" sz="1500" dirty="0">
+                <a:solidFill>
+                  <a:schemeClr val="accent6"/>
+                </a:solidFill>
+              </a:rPr>
+              <a:t>ScSh</a:t>
+            </a:r>
+          </a:p>
+          <a:p>
+            <a:pPr algn="ctr"/>
+            <a:r>
+              <a:rPr lang="en-DE" sz="1500" dirty="0">
+                <a:solidFill>
+                  <a:schemeClr val="accent6"/>
+                </a:solidFill>
+              </a:rPr>
+              <a:t>File</a:t>
             </a:r>
           </a:p>
         </p:txBody>

</xml_diff>

<commit_message>
Moved ß to s. Adjusted vis.
</commit_message>
<xml_diff>
--- a/crkbd layout.pptx
+++ b/crkbd layout.pptx
@@ -264,7 +264,7 @@
           <a:p>
             <a:fld id="{69ADB622-6004-FC41-B12B-9423FD606E5F}" type="datetimeFigureOut">
               <a:rPr lang="en-DE" smtClean="0"/>
-              <a:t>28.03.23</a:t>
+              <a:t>04.04.23</a:t>
             </a:fld>
             <a:endParaRPr lang="en-DE"/>
           </a:p>
@@ -464,7 +464,7 @@
           <a:p>
             <a:fld id="{69ADB622-6004-FC41-B12B-9423FD606E5F}" type="datetimeFigureOut">
               <a:rPr lang="en-DE" smtClean="0"/>
-              <a:t>28.03.23</a:t>
+              <a:t>04.04.23</a:t>
             </a:fld>
             <a:endParaRPr lang="en-DE"/>
           </a:p>
@@ -674,7 +674,7 @@
           <a:p>
             <a:fld id="{69ADB622-6004-FC41-B12B-9423FD606E5F}" type="datetimeFigureOut">
               <a:rPr lang="en-DE" smtClean="0"/>
-              <a:t>28.03.23</a:t>
+              <a:t>04.04.23</a:t>
             </a:fld>
             <a:endParaRPr lang="en-DE"/>
           </a:p>
@@ -874,7 +874,7 @@
           <a:p>
             <a:fld id="{69ADB622-6004-FC41-B12B-9423FD606E5F}" type="datetimeFigureOut">
               <a:rPr lang="en-DE" smtClean="0"/>
-              <a:t>28.03.23</a:t>
+              <a:t>04.04.23</a:t>
             </a:fld>
             <a:endParaRPr lang="en-DE"/>
           </a:p>
@@ -1150,7 +1150,7 @@
           <a:p>
             <a:fld id="{69ADB622-6004-FC41-B12B-9423FD606E5F}" type="datetimeFigureOut">
               <a:rPr lang="en-DE" smtClean="0"/>
-              <a:t>28.03.23</a:t>
+              <a:t>04.04.23</a:t>
             </a:fld>
             <a:endParaRPr lang="en-DE"/>
           </a:p>
@@ -1418,7 +1418,7 @@
           <a:p>
             <a:fld id="{69ADB622-6004-FC41-B12B-9423FD606E5F}" type="datetimeFigureOut">
               <a:rPr lang="en-DE" smtClean="0"/>
-              <a:t>28.03.23</a:t>
+              <a:t>04.04.23</a:t>
             </a:fld>
             <a:endParaRPr lang="en-DE"/>
           </a:p>
@@ -1833,7 +1833,7 @@
           <a:p>
             <a:fld id="{69ADB622-6004-FC41-B12B-9423FD606E5F}" type="datetimeFigureOut">
               <a:rPr lang="en-DE" smtClean="0"/>
-              <a:t>28.03.23</a:t>
+              <a:t>04.04.23</a:t>
             </a:fld>
             <a:endParaRPr lang="en-DE"/>
           </a:p>
@@ -1975,7 +1975,7 @@
           <a:p>
             <a:fld id="{69ADB622-6004-FC41-B12B-9423FD606E5F}" type="datetimeFigureOut">
               <a:rPr lang="en-DE" smtClean="0"/>
-              <a:t>28.03.23</a:t>
+              <a:t>04.04.23</a:t>
             </a:fld>
             <a:endParaRPr lang="en-DE"/>
           </a:p>
@@ -2088,7 +2088,7 @@
           <a:p>
             <a:fld id="{69ADB622-6004-FC41-B12B-9423FD606E5F}" type="datetimeFigureOut">
               <a:rPr lang="en-DE" smtClean="0"/>
-              <a:t>28.03.23</a:t>
+              <a:t>04.04.23</a:t>
             </a:fld>
             <a:endParaRPr lang="en-DE"/>
           </a:p>
@@ -2401,7 +2401,7 @@
           <a:p>
             <a:fld id="{69ADB622-6004-FC41-B12B-9423FD606E5F}" type="datetimeFigureOut">
               <a:rPr lang="en-DE" smtClean="0"/>
-              <a:t>28.03.23</a:t>
+              <a:t>04.04.23</a:t>
             </a:fld>
             <a:endParaRPr lang="en-DE"/>
           </a:p>
@@ -2690,7 +2690,7 @@
           <a:p>
             <a:fld id="{69ADB622-6004-FC41-B12B-9423FD606E5F}" type="datetimeFigureOut">
               <a:rPr lang="en-DE" smtClean="0"/>
-              <a:t>28.03.23</a:t>
+              <a:t>04.04.23</a:t>
             </a:fld>
             <a:endParaRPr lang="en-DE"/>
           </a:p>
@@ -2933,7 +2933,7 @@
           <a:p>
             <a:fld id="{69ADB622-6004-FC41-B12B-9423FD606E5F}" type="datetimeFigureOut">
               <a:rPr lang="en-DE" smtClean="0"/>
-              <a:t>28.03.23</a:t>
+              <a:t>04.04.23</a:t>
             </a:fld>
             <a:endParaRPr lang="en-DE"/>
           </a:p>
@@ -8645,7 +8645,7 @@
         </p:nvSpPr>
         <p:spPr>
           <a:xfrm>
-            <a:off x="1775622" y="2220203"/>
+            <a:off x="1742908" y="2256906"/>
             <a:ext cx="465285" cy="523220"/>
           </a:xfrm>
           <a:prstGeom prst="rect">
@@ -8795,6 +8795,132 @@
                 </a:solidFill>
               </a:rPr>
               <a:t>%</a:t>
+            </a:r>
+          </a:p>
+        </p:txBody>
+      </p:sp>
+      <p:sp>
+        <p:nvSpPr>
+          <p:cNvPr id="2" name="TextBox 1">
+            <a:extLst>
+              <a:ext uri="{FF2B5EF4-FFF2-40B4-BE49-F238E27FC236}">
+                <a16:creationId xmlns:a16="http://schemas.microsoft.com/office/drawing/2014/main" id="{74A15A99-48C1-ADFB-4EE2-2C0CFE697883}"/>
+              </a:ext>
+            </a:extLst>
+          </p:cNvPr>
+          <p:cNvSpPr txBox="1"/>
+          <p:nvPr/>
+        </p:nvSpPr>
+        <p:spPr>
+          <a:xfrm>
+            <a:off x="986721" y="2445539"/>
+            <a:ext cx="465285" cy="523220"/>
+          </a:xfrm>
+          <a:prstGeom prst="rect">
+            <a:avLst/>
+          </a:prstGeom>
+          <a:noFill/>
+        </p:spPr>
+        <p:txBody>
+          <a:bodyPr wrap="square" rtlCol="0">
+            <a:spAutoFit/>
+          </a:bodyPr>
+          <a:lstStyle/>
+          <a:p>
+            <a:pPr algn="ctr"/>
+            <a:r>
+              <a:rPr lang="en-DE" sz="2800" dirty="0">
+                <a:solidFill>
+                  <a:schemeClr val="accent2">
+                    <a:lumMod val="75000"/>
+                  </a:schemeClr>
+                </a:solidFill>
+              </a:rPr>
+              <a:t>Ä</a:t>
+            </a:r>
+          </a:p>
+        </p:txBody>
+      </p:sp>
+      <p:sp>
+        <p:nvSpPr>
+          <p:cNvPr id="3" name="TextBox 2">
+            <a:extLst>
+              <a:ext uri="{FF2B5EF4-FFF2-40B4-BE49-F238E27FC236}">
+                <a16:creationId xmlns:a16="http://schemas.microsoft.com/office/drawing/2014/main" id="{774848C0-D23A-779F-1FC1-3C41C20B13FC}"/>
+              </a:ext>
+            </a:extLst>
+          </p:cNvPr>
+          <p:cNvSpPr txBox="1"/>
+          <p:nvPr/>
+        </p:nvSpPr>
+        <p:spPr>
+          <a:xfrm>
+            <a:off x="2540530" y="2135295"/>
+            <a:ext cx="465285" cy="523220"/>
+          </a:xfrm>
+          <a:prstGeom prst="rect">
+            <a:avLst/>
+          </a:prstGeom>
+          <a:noFill/>
+        </p:spPr>
+        <p:txBody>
+          <a:bodyPr wrap="square" rtlCol="0">
+            <a:spAutoFit/>
+          </a:bodyPr>
+          <a:lstStyle/>
+          <a:p>
+            <a:pPr algn="ctr"/>
+            <a:r>
+              <a:rPr lang="en-DE" sz="2800" dirty="0">
+                <a:solidFill>
+                  <a:schemeClr val="accent2">
+                    <a:lumMod val="75000"/>
+                  </a:schemeClr>
+                </a:solidFill>
+              </a:rPr>
+              <a:t>Ö</a:t>
+            </a:r>
+          </a:p>
+        </p:txBody>
+      </p:sp>
+      <p:sp>
+        <p:nvSpPr>
+          <p:cNvPr id="4" name="TextBox 3">
+            <a:extLst>
+              <a:ext uri="{FF2B5EF4-FFF2-40B4-BE49-F238E27FC236}">
+                <a16:creationId xmlns:a16="http://schemas.microsoft.com/office/drawing/2014/main" id="{1B63A938-EDBB-579A-7B3B-3186D85CAC93}"/>
+              </a:ext>
+            </a:extLst>
+          </p:cNvPr>
+          <p:cNvSpPr txBox="1"/>
+          <p:nvPr/>
+        </p:nvSpPr>
+        <p:spPr>
+          <a:xfrm>
+            <a:off x="3310996" y="2219962"/>
+            <a:ext cx="465285" cy="523220"/>
+          </a:xfrm>
+          <a:prstGeom prst="rect">
+            <a:avLst/>
+          </a:prstGeom>
+          <a:noFill/>
+        </p:spPr>
+        <p:txBody>
+          <a:bodyPr wrap="square" rtlCol="0">
+            <a:spAutoFit/>
+          </a:bodyPr>
+          <a:lstStyle/>
+          <a:p>
+            <a:pPr algn="ctr"/>
+            <a:r>
+              <a:rPr lang="en-DE" sz="2800" dirty="0">
+                <a:solidFill>
+                  <a:schemeClr val="accent2">
+                    <a:lumMod val="75000"/>
+                  </a:schemeClr>
+                </a:solidFill>
+              </a:rPr>
+              <a:t>Ü</a:t>
             </a:r>
           </a:p>
         </p:txBody>

</xml_diff>

<commit_message>
Moved alt and ctrl around. See vis for details.
</commit_message>
<xml_diff>
--- a/crkbd layout.pptx
+++ b/crkbd layout.pptx
@@ -264,7 +264,7 @@
           <a:p>
             <a:fld id="{69ADB622-6004-FC41-B12B-9423FD606E5F}" type="datetimeFigureOut">
               <a:rPr lang="en-DE" smtClean="0"/>
-              <a:t>04.04.23</a:t>
+              <a:t>13.04.23</a:t>
             </a:fld>
             <a:endParaRPr lang="en-DE"/>
           </a:p>
@@ -464,7 +464,7 @@
           <a:p>
             <a:fld id="{69ADB622-6004-FC41-B12B-9423FD606E5F}" type="datetimeFigureOut">
               <a:rPr lang="en-DE" smtClean="0"/>
-              <a:t>04.04.23</a:t>
+              <a:t>13.04.23</a:t>
             </a:fld>
             <a:endParaRPr lang="en-DE"/>
           </a:p>
@@ -674,7 +674,7 @@
           <a:p>
             <a:fld id="{69ADB622-6004-FC41-B12B-9423FD606E5F}" type="datetimeFigureOut">
               <a:rPr lang="en-DE" smtClean="0"/>
-              <a:t>04.04.23</a:t>
+              <a:t>13.04.23</a:t>
             </a:fld>
             <a:endParaRPr lang="en-DE"/>
           </a:p>
@@ -874,7 +874,7 @@
           <a:p>
             <a:fld id="{69ADB622-6004-FC41-B12B-9423FD606E5F}" type="datetimeFigureOut">
               <a:rPr lang="en-DE" smtClean="0"/>
-              <a:t>04.04.23</a:t>
+              <a:t>13.04.23</a:t>
             </a:fld>
             <a:endParaRPr lang="en-DE"/>
           </a:p>
@@ -1150,7 +1150,7 @@
           <a:p>
             <a:fld id="{69ADB622-6004-FC41-B12B-9423FD606E5F}" type="datetimeFigureOut">
               <a:rPr lang="en-DE" smtClean="0"/>
-              <a:t>04.04.23</a:t>
+              <a:t>13.04.23</a:t>
             </a:fld>
             <a:endParaRPr lang="en-DE"/>
           </a:p>
@@ -1418,7 +1418,7 @@
           <a:p>
             <a:fld id="{69ADB622-6004-FC41-B12B-9423FD606E5F}" type="datetimeFigureOut">
               <a:rPr lang="en-DE" smtClean="0"/>
-              <a:t>04.04.23</a:t>
+              <a:t>13.04.23</a:t>
             </a:fld>
             <a:endParaRPr lang="en-DE"/>
           </a:p>
@@ -1833,7 +1833,7 @@
           <a:p>
             <a:fld id="{69ADB622-6004-FC41-B12B-9423FD606E5F}" type="datetimeFigureOut">
               <a:rPr lang="en-DE" smtClean="0"/>
-              <a:t>04.04.23</a:t>
+              <a:t>13.04.23</a:t>
             </a:fld>
             <a:endParaRPr lang="en-DE"/>
           </a:p>
@@ -1975,7 +1975,7 @@
           <a:p>
             <a:fld id="{69ADB622-6004-FC41-B12B-9423FD606E5F}" type="datetimeFigureOut">
               <a:rPr lang="en-DE" smtClean="0"/>
-              <a:t>04.04.23</a:t>
+              <a:t>13.04.23</a:t>
             </a:fld>
             <a:endParaRPr lang="en-DE"/>
           </a:p>
@@ -2088,7 +2088,7 @@
           <a:p>
             <a:fld id="{69ADB622-6004-FC41-B12B-9423FD606E5F}" type="datetimeFigureOut">
               <a:rPr lang="en-DE" smtClean="0"/>
-              <a:t>04.04.23</a:t>
+              <a:t>13.04.23</a:t>
             </a:fld>
             <a:endParaRPr lang="en-DE"/>
           </a:p>
@@ -2401,7 +2401,7 @@
           <a:p>
             <a:fld id="{69ADB622-6004-FC41-B12B-9423FD606E5F}" type="datetimeFigureOut">
               <a:rPr lang="en-DE" smtClean="0"/>
-              <a:t>04.04.23</a:t>
+              <a:t>13.04.23</a:t>
             </a:fld>
             <a:endParaRPr lang="en-DE"/>
           </a:p>
@@ -2690,7 +2690,7 @@
           <a:p>
             <a:fld id="{69ADB622-6004-FC41-B12B-9423FD606E5F}" type="datetimeFigureOut">
               <a:rPr lang="en-DE" smtClean="0"/>
-              <a:t>04.04.23</a:t>
+              <a:t>13.04.23</a:t>
             </a:fld>
             <a:endParaRPr lang="en-DE"/>
           </a:p>
@@ -2933,7 +2933,7 @@
           <a:p>
             <a:fld id="{69ADB622-6004-FC41-B12B-9423FD606E5F}" type="datetimeFigureOut">
               <a:rPr lang="en-DE" smtClean="0"/>
-              <a:t>04.04.23</a:t>
+              <a:t>13.04.23</a:t>
             </a:fld>
             <a:endParaRPr lang="en-DE"/>
           </a:p>
@@ -3911,28 +3911,28 @@
         </p:nvSpPr>
         <p:spPr>
           <a:xfrm>
-            <a:off x="99793" y="2555585"/>
-            <a:ext cx="639947" cy="400110"/>
-          </a:xfrm>
-          <a:prstGeom prst="rect">
-            <a:avLst/>
-          </a:prstGeom>
-          <a:noFill/>
-        </p:spPr>
-        <p:txBody>
-          <a:bodyPr wrap="square" rtlCol="0">
-            <a:spAutoFit/>
-          </a:bodyPr>
-          <a:lstStyle/>
-          <a:p>
-            <a:pPr algn="ctr"/>
-            <a:r>
-              <a:rPr lang="en-DE" sz="2000" dirty="0">
+            <a:off x="83207" y="2492787"/>
+            <a:ext cx="639947" cy="523220"/>
+          </a:xfrm>
+          <a:prstGeom prst="rect">
+            <a:avLst/>
+          </a:prstGeom>
+          <a:noFill/>
+        </p:spPr>
+        <p:txBody>
+          <a:bodyPr wrap="square" rtlCol="0">
+            <a:spAutoFit/>
+          </a:bodyPr>
+          <a:lstStyle/>
+          <a:p>
+            <a:pPr algn="ctr"/>
+            <a:r>
+              <a:rPr lang="en-DE" sz="2800" dirty="0">
                 <a:solidFill>
                   <a:schemeClr val="bg1"/>
                 </a:solidFill>
               </a:rPr>
-              <a:t>LC</a:t>
+              <a:t>LA</a:t>
             </a:r>
           </a:p>
         </p:txBody>
@@ -4181,46 +4181,6 @@
       </p:sp>
       <p:sp>
         <p:nvSpPr>
-          <p:cNvPr id="40" name="TextBox 39">
-            <a:extLst>
-              <a:ext uri="{FF2B5EF4-FFF2-40B4-BE49-F238E27FC236}">
-                <a16:creationId xmlns:a16="http://schemas.microsoft.com/office/drawing/2014/main" id="{A7EB99A4-0CF5-4302-F13E-B3CB71D4BDF6}"/>
-              </a:ext>
-            </a:extLst>
-          </p:cNvPr>
-          <p:cNvSpPr txBox="1"/>
-          <p:nvPr/>
-        </p:nvSpPr>
-        <p:spPr>
-          <a:xfrm>
-            <a:off x="8702425" y="4074351"/>
-            <a:ext cx="640611" cy="523220"/>
-          </a:xfrm>
-          <a:prstGeom prst="rect">
-            <a:avLst/>
-          </a:prstGeom>
-          <a:noFill/>
-        </p:spPr>
-        <p:txBody>
-          <a:bodyPr wrap="square" rtlCol="0">
-            <a:spAutoFit/>
-          </a:bodyPr>
-          <a:lstStyle/>
-          <a:p>
-            <a:pPr algn="ctr"/>
-            <a:r>
-              <a:rPr lang="en-DE" sz="2800" dirty="0">
-                <a:solidFill>
-                  <a:schemeClr val="bg1"/>
-                </a:solidFill>
-              </a:rPr>
-              <a:t>RA</a:t>
-            </a:r>
-          </a:p>
-        </p:txBody>
-      </p:sp>
-      <p:sp>
-        <p:nvSpPr>
           <p:cNvPr id="41" name="TextBox 40">
             <a:extLst>
               <a:ext uri="{FF2B5EF4-FFF2-40B4-BE49-F238E27FC236}">
@@ -4913,7 +4873,7 @@
         </p:nvSpPr>
         <p:spPr>
           <a:xfrm>
-            <a:off x="11447108" y="3320808"/>
+            <a:off x="8744848" y="4065686"/>
             <a:ext cx="618989" cy="523220"/>
           </a:xfrm>
           <a:prstGeom prst="rect">
@@ -4934,7 +4894,7 @@
                   <a:schemeClr val="bg1"/>
                 </a:solidFill>
               </a:rPr>
-              <a:t>RS</a:t>
+              <a:t>RC</a:t>
             </a:r>
           </a:p>
         </p:txBody>
@@ -5674,6 +5634,86 @@
         <p:spPr>
           <a:xfrm>
             <a:off x="242571" y="3609460"/>
+            <a:ext cx="639947" cy="323165"/>
+          </a:xfrm>
+          <a:prstGeom prst="rect">
+            <a:avLst/>
+          </a:prstGeom>
+          <a:noFill/>
+        </p:spPr>
+        <p:txBody>
+          <a:bodyPr wrap="square" rtlCol="0">
+            <a:spAutoFit/>
+          </a:bodyPr>
+          <a:lstStyle/>
+          <a:p>
+            <a:pPr algn="ctr"/>
+            <a:r>
+              <a:rPr lang="en-DE" sz="1500" dirty="0">
+                <a:solidFill>
+                  <a:schemeClr val="bg1"/>
+                </a:solidFill>
+              </a:rPr>
+              <a:t>LC</a:t>
+            </a:r>
+          </a:p>
+        </p:txBody>
+      </p:sp>
+      <p:sp>
+        <p:nvSpPr>
+          <p:cNvPr id="3" name="TextBox 2">
+            <a:extLst>
+              <a:ext uri="{FF2B5EF4-FFF2-40B4-BE49-F238E27FC236}">
+                <a16:creationId xmlns:a16="http://schemas.microsoft.com/office/drawing/2014/main" id="{2F4335D2-DB83-A867-5340-B83E615B242E}"/>
+              </a:ext>
+            </a:extLst>
+          </p:cNvPr>
+          <p:cNvSpPr txBox="1"/>
+          <p:nvPr/>
+        </p:nvSpPr>
+        <p:spPr>
+          <a:xfrm>
+            <a:off x="11331608" y="3215703"/>
+            <a:ext cx="639947" cy="523220"/>
+          </a:xfrm>
+          <a:prstGeom prst="rect">
+            <a:avLst/>
+          </a:prstGeom>
+          <a:noFill/>
+        </p:spPr>
+        <p:txBody>
+          <a:bodyPr wrap="square" rtlCol="0">
+            <a:spAutoFit/>
+          </a:bodyPr>
+          <a:lstStyle/>
+          <a:p>
+            <a:pPr algn="ctr"/>
+            <a:r>
+              <a:rPr lang="en-DE" sz="2800" dirty="0">
+                <a:solidFill>
+                  <a:schemeClr val="bg1"/>
+                </a:solidFill>
+              </a:rPr>
+              <a:t>RS</a:t>
+            </a:r>
+          </a:p>
+        </p:txBody>
+      </p:sp>
+      <p:sp>
+        <p:nvSpPr>
+          <p:cNvPr id="4" name="TextBox 3">
+            <a:extLst>
+              <a:ext uri="{FF2B5EF4-FFF2-40B4-BE49-F238E27FC236}">
+                <a16:creationId xmlns:a16="http://schemas.microsoft.com/office/drawing/2014/main" id="{AD4EC116-4E02-62F0-0620-711BCE01DA60}"/>
+              </a:ext>
+            </a:extLst>
+          </p:cNvPr>
+          <p:cNvSpPr txBox="1"/>
+          <p:nvPr/>
+        </p:nvSpPr>
+        <p:spPr>
+          <a:xfrm>
+            <a:off x="11559702" y="3625630"/>
             <a:ext cx="639947" cy="323165"/>
           </a:xfrm>
           <a:prstGeom prst="rect">

</xml_diff>

<commit_message>
Emoji pane typo fixed, vis update.
</commit_message>
<xml_diff>
--- a/crkbd layout.pptx
+++ b/crkbd layout.pptx
@@ -4,6 +4,9 @@
   <p:sldMasterIdLst>
     <p:sldMasterId id="2147483648" r:id="rId1"/>
   </p:sldMasterIdLst>
+  <p:notesMasterIdLst>
+    <p:notesMasterId r:id="rId6"/>
+  </p:notesMasterIdLst>
   <p:sldIdLst>
     <p:sldId id="256" r:id="rId2"/>
     <p:sldId id="257" r:id="rId3"/>
@@ -115,6 +118,692 @@
 </p:presentation>
 </file>
 
+<file path=ppt/notesMasters/notesMaster1.xml><?xml version="1.0" encoding="utf-8"?>
+<p:notesMaster xmlns:a="http://schemas.openxmlformats.org/drawingml/2006/main" xmlns:r="http://schemas.openxmlformats.org/officeDocument/2006/relationships" xmlns:p="http://schemas.openxmlformats.org/presentationml/2006/main">
+  <p:cSld>
+    <p:bg>
+      <p:bgRef idx="1001">
+        <a:schemeClr val="bg1"/>
+      </p:bgRef>
+    </p:bg>
+    <p:spTree>
+      <p:nvGrpSpPr>
+        <p:cNvPr id="1" name=""/>
+        <p:cNvGrpSpPr/>
+        <p:nvPr/>
+      </p:nvGrpSpPr>
+      <p:grpSpPr>
+        <a:xfrm>
+          <a:off x="0" y="0"/>
+          <a:ext cx="0" cy="0"/>
+          <a:chOff x="0" y="0"/>
+          <a:chExt cx="0" cy="0"/>
+        </a:xfrm>
+      </p:grpSpPr>
+      <p:sp>
+        <p:nvSpPr>
+          <p:cNvPr id="2" name="Header Placeholder 1"/>
+          <p:cNvSpPr>
+            <a:spLocks noGrp="1"/>
+          </p:cNvSpPr>
+          <p:nvPr>
+            <p:ph type="hdr" sz="quarter"/>
+          </p:nvPr>
+        </p:nvSpPr>
+        <p:spPr>
+          <a:xfrm>
+            <a:off x="0" y="0"/>
+            <a:ext cx="2971800" cy="458788"/>
+          </a:xfrm>
+          <a:prstGeom prst="rect">
+            <a:avLst/>
+          </a:prstGeom>
+        </p:spPr>
+        <p:txBody>
+          <a:bodyPr vert="horz" lIns="91440" tIns="45720" rIns="91440" bIns="45720" rtlCol="0"/>
+          <a:lstStyle>
+            <a:lvl1pPr algn="l">
+              <a:defRPr sz="1200"/>
+            </a:lvl1pPr>
+          </a:lstStyle>
+          <a:p>
+            <a:endParaRPr lang="en-DE"/>
+          </a:p>
+        </p:txBody>
+      </p:sp>
+      <p:sp>
+        <p:nvSpPr>
+          <p:cNvPr id="3" name="Date Placeholder 2"/>
+          <p:cNvSpPr>
+            <a:spLocks noGrp="1"/>
+          </p:cNvSpPr>
+          <p:nvPr>
+            <p:ph type="dt" idx="1"/>
+          </p:nvPr>
+        </p:nvSpPr>
+        <p:spPr>
+          <a:xfrm>
+            <a:off x="3884613" y="0"/>
+            <a:ext cx="2971800" cy="458788"/>
+          </a:xfrm>
+          <a:prstGeom prst="rect">
+            <a:avLst/>
+          </a:prstGeom>
+        </p:spPr>
+        <p:txBody>
+          <a:bodyPr vert="horz" lIns="91440" tIns="45720" rIns="91440" bIns="45720" rtlCol="0"/>
+          <a:lstStyle>
+            <a:lvl1pPr algn="r">
+              <a:defRPr sz="1200"/>
+            </a:lvl1pPr>
+          </a:lstStyle>
+          <a:p>
+            <a:fld id="{A65414A6-467C-E047-9550-65B799CB296F}" type="datetimeFigureOut">
+              <a:rPr lang="en-DE" smtClean="0"/>
+              <a:t>02.05.23</a:t>
+            </a:fld>
+            <a:endParaRPr lang="en-DE"/>
+          </a:p>
+        </p:txBody>
+      </p:sp>
+      <p:sp>
+        <p:nvSpPr>
+          <p:cNvPr id="4" name="Slide Image Placeholder 3"/>
+          <p:cNvSpPr>
+            <a:spLocks noGrp="1" noRot="1" noChangeAspect="1"/>
+          </p:cNvSpPr>
+          <p:nvPr>
+            <p:ph type="sldImg" idx="2"/>
+          </p:nvPr>
+        </p:nvSpPr>
+        <p:spPr>
+          <a:xfrm>
+            <a:off x="685800" y="1143000"/>
+            <a:ext cx="5486400" cy="3086100"/>
+          </a:xfrm>
+          <a:prstGeom prst="rect">
+            <a:avLst/>
+          </a:prstGeom>
+          <a:noFill/>
+          <a:ln w="12700">
+            <a:solidFill>
+              <a:prstClr val="black"/>
+            </a:solidFill>
+          </a:ln>
+        </p:spPr>
+        <p:txBody>
+          <a:bodyPr vert="horz" lIns="91440" tIns="45720" rIns="91440" bIns="45720" rtlCol="0" anchor="ctr"/>
+          <a:lstStyle/>
+          <a:p>
+            <a:endParaRPr lang="en-DE"/>
+          </a:p>
+        </p:txBody>
+      </p:sp>
+      <p:sp>
+        <p:nvSpPr>
+          <p:cNvPr id="5" name="Notes Placeholder 4"/>
+          <p:cNvSpPr>
+            <a:spLocks noGrp="1"/>
+          </p:cNvSpPr>
+          <p:nvPr>
+            <p:ph type="body" sz="quarter" idx="3"/>
+          </p:nvPr>
+        </p:nvSpPr>
+        <p:spPr>
+          <a:xfrm>
+            <a:off x="685800" y="4400550"/>
+            <a:ext cx="5486400" cy="3600450"/>
+          </a:xfrm>
+          <a:prstGeom prst="rect">
+            <a:avLst/>
+          </a:prstGeom>
+        </p:spPr>
+        <p:txBody>
+          <a:bodyPr vert="horz" lIns="91440" tIns="45720" rIns="91440" bIns="45720" rtlCol="0"/>
+          <a:lstStyle/>
+          <a:p>
+            <a:pPr lvl="0"/>
+            <a:r>
+              <a:rPr lang="en-US"/>
+              <a:t>Click to edit Master text styles</a:t>
+            </a:r>
+          </a:p>
+          <a:p>
+            <a:pPr lvl="1"/>
+            <a:r>
+              <a:rPr lang="en-US"/>
+              <a:t>Second level</a:t>
+            </a:r>
+          </a:p>
+          <a:p>
+            <a:pPr lvl="2"/>
+            <a:r>
+              <a:rPr lang="en-US"/>
+              <a:t>Third level</a:t>
+            </a:r>
+          </a:p>
+          <a:p>
+            <a:pPr lvl="3"/>
+            <a:r>
+              <a:rPr lang="en-US"/>
+              <a:t>Fourth level</a:t>
+            </a:r>
+          </a:p>
+          <a:p>
+            <a:pPr lvl="4"/>
+            <a:r>
+              <a:rPr lang="en-US"/>
+              <a:t>Fifth level</a:t>
+            </a:r>
+            <a:endParaRPr lang="en-DE"/>
+          </a:p>
+        </p:txBody>
+      </p:sp>
+      <p:sp>
+        <p:nvSpPr>
+          <p:cNvPr id="6" name="Footer Placeholder 5"/>
+          <p:cNvSpPr>
+            <a:spLocks noGrp="1"/>
+          </p:cNvSpPr>
+          <p:nvPr>
+            <p:ph type="ftr" sz="quarter" idx="4"/>
+          </p:nvPr>
+        </p:nvSpPr>
+        <p:spPr>
+          <a:xfrm>
+            <a:off x="0" y="8685213"/>
+            <a:ext cx="2971800" cy="458787"/>
+          </a:xfrm>
+          <a:prstGeom prst="rect">
+            <a:avLst/>
+          </a:prstGeom>
+        </p:spPr>
+        <p:txBody>
+          <a:bodyPr vert="horz" lIns="91440" tIns="45720" rIns="91440" bIns="45720" rtlCol="0" anchor="b"/>
+          <a:lstStyle>
+            <a:lvl1pPr algn="l">
+              <a:defRPr sz="1200"/>
+            </a:lvl1pPr>
+          </a:lstStyle>
+          <a:p>
+            <a:endParaRPr lang="en-DE"/>
+          </a:p>
+        </p:txBody>
+      </p:sp>
+      <p:sp>
+        <p:nvSpPr>
+          <p:cNvPr id="7" name="Slide Number Placeholder 6"/>
+          <p:cNvSpPr>
+            <a:spLocks noGrp="1"/>
+          </p:cNvSpPr>
+          <p:nvPr>
+            <p:ph type="sldNum" sz="quarter" idx="5"/>
+          </p:nvPr>
+        </p:nvSpPr>
+        <p:spPr>
+          <a:xfrm>
+            <a:off x="3884613" y="8685213"/>
+            <a:ext cx="2971800" cy="458787"/>
+          </a:xfrm>
+          <a:prstGeom prst="rect">
+            <a:avLst/>
+          </a:prstGeom>
+        </p:spPr>
+        <p:txBody>
+          <a:bodyPr vert="horz" lIns="91440" tIns="45720" rIns="91440" bIns="45720" rtlCol="0" anchor="b"/>
+          <a:lstStyle>
+            <a:lvl1pPr algn="r">
+              <a:defRPr sz="1200"/>
+            </a:lvl1pPr>
+          </a:lstStyle>
+          <a:p>
+            <a:fld id="{A6A4F0CB-034C-7A4F-8C73-FAD4D1B8FCBD}" type="slidenum">
+              <a:rPr lang="en-DE" smtClean="0"/>
+              <a:t>‹#›</a:t>
+            </a:fld>
+            <a:endParaRPr lang="en-DE"/>
+          </a:p>
+        </p:txBody>
+      </p:sp>
+    </p:spTree>
+    <p:extLst>
+      <p:ext uri="{BB962C8B-B14F-4D97-AF65-F5344CB8AC3E}">
+        <p14:creationId xmlns:p14="http://schemas.microsoft.com/office/powerpoint/2010/main" val="356616824"/>
+      </p:ext>
+    </p:extLst>
+  </p:cSld>
+  <p:clrMap bg1="lt1" tx1="dk1" bg2="lt2" tx2="dk2" accent1="accent1" accent2="accent2" accent3="accent3" accent4="accent4" accent5="accent5" accent6="accent6" hlink="hlink" folHlink="folHlink"/>
+  <p:notesStyle>
+    <a:lvl1pPr marL="0" algn="l" defTabSz="914400" rtl="0" eaLnBrk="1" latinLnBrk="0" hangingPunct="1">
+      <a:defRPr sz="1200" kern="1200">
+        <a:solidFill>
+          <a:schemeClr val="tx1"/>
+        </a:solidFill>
+        <a:latin typeface="+mn-lt"/>
+        <a:ea typeface="+mn-ea"/>
+        <a:cs typeface="+mn-cs"/>
+      </a:defRPr>
+    </a:lvl1pPr>
+    <a:lvl2pPr marL="457200" algn="l" defTabSz="914400" rtl="0" eaLnBrk="1" latinLnBrk="0" hangingPunct="1">
+      <a:defRPr sz="1200" kern="1200">
+        <a:solidFill>
+          <a:schemeClr val="tx1"/>
+        </a:solidFill>
+        <a:latin typeface="+mn-lt"/>
+        <a:ea typeface="+mn-ea"/>
+        <a:cs typeface="+mn-cs"/>
+      </a:defRPr>
+    </a:lvl2pPr>
+    <a:lvl3pPr marL="914400" algn="l" defTabSz="914400" rtl="0" eaLnBrk="1" latinLnBrk="0" hangingPunct="1">
+      <a:defRPr sz="1200" kern="1200">
+        <a:solidFill>
+          <a:schemeClr val="tx1"/>
+        </a:solidFill>
+        <a:latin typeface="+mn-lt"/>
+        <a:ea typeface="+mn-ea"/>
+        <a:cs typeface="+mn-cs"/>
+      </a:defRPr>
+    </a:lvl3pPr>
+    <a:lvl4pPr marL="1371600" algn="l" defTabSz="914400" rtl="0" eaLnBrk="1" latinLnBrk="0" hangingPunct="1">
+      <a:defRPr sz="1200" kern="1200">
+        <a:solidFill>
+          <a:schemeClr val="tx1"/>
+        </a:solidFill>
+        <a:latin typeface="+mn-lt"/>
+        <a:ea typeface="+mn-ea"/>
+        <a:cs typeface="+mn-cs"/>
+      </a:defRPr>
+    </a:lvl4pPr>
+    <a:lvl5pPr marL="1828800" algn="l" defTabSz="914400" rtl="0" eaLnBrk="1" latinLnBrk="0" hangingPunct="1">
+      <a:defRPr sz="1200" kern="1200">
+        <a:solidFill>
+          <a:schemeClr val="tx1"/>
+        </a:solidFill>
+        <a:latin typeface="+mn-lt"/>
+        <a:ea typeface="+mn-ea"/>
+        <a:cs typeface="+mn-cs"/>
+      </a:defRPr>
+    </a:lvl5pPr>
+    <a:lvl6pPr marL="2286000" algn="l" defTabSz="914400" rtl="0" eaLnBrk="1" latinLnBrk="0" hangingPunct="1">
+      <a:defRPr sz="1200" kern="1200">
+        <a:solidFill>
+          <a:schemeClr val="tx1"/>
+        </a:solidFill>
+        <a:latin typeface="+mn-lt"/>
+        <a:ea typeface="+mn-ea"/>
+        <a:cs typeface="+mn-cs"/>
+      </a:defRPr>
+    </a:lvl6pPr>
+    <a:lvl7pPr marL="2743200" algn="l" defTabSz="914400" rtl="0" eaLnBrk="1" latinLnBrk="0" hangingPunct="1">
+      <a:defRPr sz="1200" kern="1200">
+        <a:solidFill>
+          <a:schemeClr val="tx1"/>
+        </a:solidFill>
+        <a:latin typeface="+mn-lt"/>
+        <a:ea typeface="+mn-ea"/>
+        <a:cs typeface="+mn-cs"/>
+      </a:defRPr>
+    </a:lvl7pPr>
+    <a:lvl8pPr marL="3200400" algn="l" defTabSz="914400" rtl="0" eaLnBrk="1" latinLnBrk="0" hangingPunct="1">
+      <a:defRPr sz="1200" kern="1200">
+        <a:solidFill>
+          <a:schemeClr val="tx1"/>
+        </a:solidFill>
+        <a:latin typeface="+mn-lt"/>
+        <a:ea typeface="+mn-ea"/>
+        <a:cs typeface="+mn-cs"/>
+      </a:defRPr>
+    </a:lvl8pPr>
+    <a:lvl9pPr marL="3657600" algn="l" defTabSz="914400" rtl="0" eaLnBrk="1" latinLnBrk="0" hangingPunct="1">
+      <a:defRPr sz="1200" kern="1200">
+        <a:solidFill>
+          <a:schemeClr val="tx1"/>
+        </a:solidFill>
+        <a:latin typeface="+mn-lt"/>
+        <a:ea typeface="+mn-ea"/>
+        <a:cs typeface="+mn-cs"/>
+      </a:defRPr>
+    </a:lvl9pPr>
+  </p:notesStyle>
+</p:notesMaster>
+</file>
+
+<file path=ppt/notesSlides/notesSlide1.xml><?xml version="1.0" encoding="utf-8"?>
+<p:notes xmlns:a="http://schemas.openxmlformats.org/drawingml/2006/main" xmlns:r="http://schemas.openxmlformats.org/officeDocument/2006/relationships" xmlns:p="http://schemas.openxmlformats.org/presentationml/2006/main">
+  <p:cSld>
+    <p:spTree>
+      <p:nvGrpSpPr>
+        <p:cNvPr id="1" name=""/>
+        <p:cNvGrpSpPr/>
+        <p:nvPr/>
+      </p:nvGrpSpPr>
+      <p:grpSpPr>
+        <a:xfrm>
+          <a:off x="0" y="0"/>
+          <a:ext cx="0" cy="0"/>
+          <a:chOff x="0" y="0"/>
+          <a:chExt cx="0" cy="0"/>
+        </a:xfrm>
+      </p:grpSpPr>
+      <p:sp>
+        <p:nvSpPr>
+          <p:cNvPr id="2" name="Slide Image Placeholder 1"/>
+          <p:cNvSpPr>
+            <a:spLocks noGrp="1" noRot="1" noChangeAspect="1"/>
+          </p:cNvSpPr>
+          <p:nvPr>
+            <p:ph type="sldImg"/>
+          </p:nvPr>
+        </p:nvSpPr>
+        <p:spPr/>
+      </p:sp>
+      <p:sp>
+        <p:nvSpPr>
+          <p:cNvPr id="3" name="Notes Placeholder 2"/>
+          <p:cNvSpPr>
+            <a:spLocks noGrp="1"/>
+          </p:cNvSpPr>
+          <p:nvPr>
+            <p:ph type="body" idx="1"/>
+          </p:nvPr>
+        </p:nvSpPr>
+        <p:spPr/>
+        <p:txBody>
+          <a:bodyPr/>
+          <a:lstStyle/>
+          <a:p>
+            <a:endParaRPr lang="en-DE"/>
+          </a:p>
+        </p:txBody>
+      </p:sp>
+      <p:sp>
+        <p:nvSpPr>
+          <p:cNvPr id="4" name="Slide Number Placeholder 3"/>
+          <p:cNvSpPr>
+            <a:spLocks noGrp="1"/>
+          </p:cNvSpPr>
+          <p:nvPr>
+            <p:ph type="sldNum" sz="quarter" idx="5"/>
+          </p:nvPr>
+        </p:nvSpPr>
+        <p:spPr/>
+        <p:txBody>
+          <a:bodyPr/>
+          <a:lstStyle/>
+          <a:p>
+            <a:fld id="{A6A4F0CB-034C-7A4F-8C73-FAD4D1B8FCBD}" type="slidenum">
+              <a:rPr lang="en-DE" smtClean="0"/>
+              <a:t>1</a:t>
+            </a:fld>
+            <a:endParaRPr lang="en-DE"/>
+          </a:p>
+        </p:txBody>
+      </p:sp>
+    </p:spTree>
+    <p:extLst>
+      <p:ext uri="{BB962C8B-B14F-4D97-AF65-F5344CB8AC3E}">
+        <p14:creationId xmlns:p14="http://schemas.microsoft.com/office/powerpoint/2010/main" val="2201466117"/>
+      </p:ext>
+    </p:extLst>
+  </p:cSld>
+  <p:clrMapOvr>
+    <a:masterClrMapping/>
+  </p:clrMapOvr>
+</p:notes>
+</file>
+
+<file path=ppt/notesSlides/notesSlide2.xml><?xml version="1.0" encoding="utf-8"?>
+<p:notes xmlns:a="http://schemas.openxmlformats.org/drawingml/2006/main" xmlns:r="http://schemas.openxmlformats.org/officeDocument/2006/relationships" xmlns:p="http://schemas.openxmlformats.org/presentationml/2006/main">
+  <p:cSld>
+    <p:spTree>
+      <p:nvGrpSpPr>
+        <p:cNvPr id="1" name=""/>
+        <p:cNvGrpSpPr/>
+        <p:nvPr/>
+      </p:nvGrpSpPr>
+      <p:grpSpPr>
+        <a:xfrm>
+          <a:off x="0" y="0"/>
+          <a:ext cx="0" cy="0"/>
+          <a:chOff x="0" y="0"/>
+          <a:chExt cx="0" cy="0"/>
+        </a:xfrm>
+      </p:grpSpPr>
+      <p:sp>
+        <p:nvSpPr>
+          <p:cNvPr id="2" name="Slide Image Placeholder 1"/>
+          <p:cNvSpPr>
+            <a:spLocks noGrp="1" noRot="1" noChangeAspect="1"/>
+          </p:cNvSpPr>
+          <p:nvPr>
+            <p:ph type="sldImg"/>
+          </p:nvPr>
+        </p:nvSpPr>
+        <p:spPr/>
+      </p:sp>
+      <p:sp>
+        <p:nvSpPr>
+          <p:cNvPr id="3" name="Notes Placeholder 2"/>
+          <p:cNvSpPr>
+            <a:spLocks noGrp="1"/>
+          </p:cNvSpPr>
+          <p:nvPr>
+            <p:ph type="body" idx="1"/>
+          </p:nvPr>
+        </p:nvSpPr>
+        <p:spPr/>
+        <p:txBody>
+          <a:bodyPr/>
+          <a:lstStyle/>
+          <a:p>
+            <a:endParaRPr lang="en-DE"/>
+          </a:p>
+        </p:txBody>
+      </p:sp>
+      <p:sp>
+        <p:nvSpPr>
+          <p:cNvPr id="4" name="Slide Number Placeholder 3"/>
+          <p:cNvSpPr>
+            <a:spLocks noGrp="1"/>
+          </p:cNvSpPr>
+          <p:nvPr>
+            <p:ph type="sldNum" sz="quarter" idx="5"/>
+          </p:nvPr>
+        </p:nvSpPr>
+        <p:spPr/>
+        <p:txBody>
+          <a:bodyPr/>
+          <a:lstStyle/>
+          <a:p>
+            <a:fld id="{A6A4F0CB-034C-7A4F-8C73-FAD4D1B8FCBD}" type="slidenum">
+              <a:rPr lang="en-DE" smtClean="0"/>
+              <a:t>2</a:t>
+            </a:fld>
+            <a:endParaRPr lang="en-DE"/>
+          </a:p>
+        </p:txBody>
+      </p:sp>
+    </p:spTree>
+    <p:extLst>
+      <p:ext uri="{BB962C8B-B14F-4D97-AF65-F5344CB8AC3E}">
+        <p14:creationId xmlns:p14="http://schemas.microsoft.com/office/powerpoint/2010/main" val="2608654071"/>
+      </p:ext>
+    </p:extLst>
+  </p:cSld>
+  <p:clrMapOvr>
+    <a:masterClrMapping/>
+  </p:clrMapOvr>
+</p:notes>
+</file>
+
+<file path=ppt/notesSlides/notesSlide3.xml><?xml version="1.0" encoding="utf-8"?>
+<p:notes xmlns:a="http://schemas.openxmlformats.org/drawingml/2006/main" xmlns:r="http://schemas.openxmlformats.org/officeDocument/2006/relationships" xmlns:p="http://schemas.openxmlformats.org/presentationml/2006/main">
+  <p:cSld>
+    <p:spTree>
+      <p:nvGrpSpPr>
+        <p:cNvPr id="1" name=""/>
+        <p:cNvGrpSpPr/>
+        <p:nvPr/>
+      </p:nvGrpSpPr>
+      <p:grpSpPr>
+        <a:xfrm>
+          <a:off x="0" y="0"/>
+          <a:ext cx="0" cy="0"/>
+          <a:chOff x="0" y="0"/>
+          <a:chExt cx="0" cy="0"/>
+        </a:xfrm>
+      </p:grpSpPr>
+      <p:sp>
+        <p:nvSpPr>
+          <p:cNvPr id="2" name="Slide Image Placeholder 1"/>
+          <p:cNvSpPr>
+            <a:spLocks noGrp="1" noRot="1" noChangeAspect="1"/>
+          </p:cNvSpPr>
+          <p:nvPr>
+            <p:ph type="sldImg"/>
+          </p:nvPr>
+        </p:nvSpPr>
+        <p:spPr/>
+      </p:sp>
+      <p:sp>
+        <p:nvSpPr>
+          <p:cNvPr id="3" name="Notes Placeholder 2"/>
+          <p:cNvSpPr>
+            <a:spLocks noGrp="1"/>
+          </p:cNvSpPr>
+          <p:nvPr>
+            <p:ph type="body" idx="1"/>
+          </p:nvPr>
+        </p:nvSpPr>
+        <p:spPr/>
+        <p:txBody>
+          <a:bodyPr/>
+          <a:lstStyle/>
+          <a:p>
+            <a:endParaRPr lang="en-DE"/>
+          </a:p>
+        </p:txBody>
+      </p:sp>
+      <p:sp>
+        <p:nvSpPr>
+          <p:cNvPr id="4" name="Slide Number Placeholder 3"/>
+          <p:cNvSpPr>
+            <a:spLocks noGrp="1"/>
+          </p:cNvSpPr>
+          <p:nvPr>
+            <p:ph type="sldNum" sz="quarter" idx="5"/>
+          </p:nvPr>
+        </p:nvSpPr>
+        <p:spPr/>
+        <p:txBody>
+          <a:bodyPr/>
+          <a:lstStyle/>
+          <a:p>
+            <a:fld id="{A6A4F0CB-034C-7A4F-8C73-FAD4D1B8FCBD}" type="slidenum">
+              <a:rPr lang="en-DE" smtClean="0"/>
+              <a:t>3</a:t>
+            </a:fld>
+            <a:endParaRPr lang="en-DE"/>
+          </a:p>
+        </p:txBody>
+      </p:sp>
+    </p:spTree>
+    <p:extLst>
+      <p:ext uri="{BB962C8B-B14F-4D97-AF65-F5344CB8AC3E}">
+        <p14:creationId xmlns:p14="http://schemas.microsoft.com/office/powerpoint/2010/main" val="2724575405"/>
+      </p:ext>
+    </p:extLst>
+  </p:cSld>
+  <p:clrMapOvr>
+    <a:masterClrMapping/>
+  </p:clrMapOvr>
+</p:notes>
+</file>
+
+<file path=ppt/notesSlides/notesSlide4.xml><?xml version="1.0" encoding="utf-8"?>
+<p:notes xmlns:a="http://schemas.openxmlformats.org/drawingml/2006/main" xmlns:r="http://schemas.openxmlformats.org/officeDocument/2006/relationships" xmlns:p="http://schemas.openxmlformats.org/presentationml/2006/main">
+  <p:cSld>
+    <p:spTree>
+      <p:nvGrpSpPr>
+        <p:cNvPr id="1" name=""/>
+        <p:cNvGrpSpPr/>
+        <p:nvPr/>
+      </p:nvGrpSpPr>
+      <p:grpSpPr>
+        <a:xfrm>
+          <a:off x="0" y="0"/>
+          <a:ext cx="0" cy="0"/>
+          <a:chOff x="0" y="0"/>
+          <a:chExt cx="0" cy="0"/>
+        </a:xfrm>
+      </p:grpSpPr>
+      <p:sp>
+        <p:nvSpPr>
+          <p:cNvPr id="2" name="Slide Image Placeholder 1"/>
+          <p:cNvSpPr>
+            <a:spLocks noGrp="1" noRot="1" noChangeAspect="1"/>
+          </p:cNvSpPr>
+          <p:nvPr>
+            <p:ph type="sldImg"/>
+          </p:nvPr>
+        </p:nvSpPr>
+        <p:spPr/>
+      </p:sp>
+      <p:sp>
+        <p:nvSpPr>
+          <p:cNvPr id="3" name="Notes Placeholder 2"/>
+          <p:cNvSpPr>
+            <a:spLocks noGrp="1"/>
+          </p:cNvSpPr>
+          <p:nvPr>
+            <p:ph type="body" idx="1"/>
+          </p:nvPr>
+        </p:nvSpPr>
+        <p:spPr/>
+        <p:txBody>
+          <a:bodyPr/>
+          <a:lstStyle/>
+          <a:p>
+            <a:endParaRPr lang="en-DE"/>
+          </a:p>
+        </p:txBody>
+      </p:sp>
+      <p:sp>
+        <p:nvSpPr>
+          <p:cNvPr id="4" name="Slide Number Placeholder 3"/>
+          <p:cNvSpPr>
+            <a:spLocks noGrp="1"/>
+          </p:cNvSpPr>
+          <p:nvPr>
+            <p:ph type="sldNum" sz="quarter" idx="5"/>
+          </p:nvPr>
+        </p:nvSpPr>
+        <p:spPr/>
+        <p:txBody>
+          <a:bodyPr/>
+          <a:lstStyle/>
+          <a:p>
+            <a:fld id="{A6A4F0CB-034C-7A4F-8C73-FAD4D1B8FCBD}" type="slidenum">
+              <a:rPr lang="en-DE" smtClean="0"/>
+              <a:t>4</a:t>
+            </a:fld>
+            <a:endParaRPr lang="en-DE"/>
+          </a:p>
+        </p:txBody>
+      </p:sp>
+    </p:spTree>
+    <p:extLst>
+      <p:ext uri="{BB962C8B-B14F-4D97-AF65-F5344CB8AC3E}">
+        <p14:creationId xmlns:p14="http://schemas.microsoft.com/office/powerpoint/2010/main" val="2951482172"/>
+      </p:ext>
+    </p:extLst>
+  </p:cSld>
+  <p:clrMapOvr>
+    <a:masterClrMapping/>
+  </p:clrMapOvr>
+</p:notes>
+</file>
+
 <file path=ppt/slideLayouts/slideLayout1.xml><?xml version="1.0" encoding="utf-8"?>
 <p:sldLayout xmlns:a="http://schemas.openxmlformats.org/drawingml/2006/main" xmlns:r="http://schemas.openxmlformats.org/officeDocument/2006/relationships" xmlns:p="http://schemas.openxmlformats.org/presentationml/2006/main" type="title" preserve="1">
   <p:cSld name="Title Slide">
@@ -264,7 +953,7 @@
           <a:p>
             <a:fld id="{69ADB622-6004-FC41-B12B-9423FD606E5F}" type="datetimeFigureOut">
               <a:rPr lang="en-DE" smtClean="0"/>
-              <a:t>26.04.23</a:t>
+              <a:t>02.05.23</a:t>
             </a:fld>
             <a:endParaRPr lang="en-DE"/>
           </a:p>
@@ -464,7 +1153,7 @@
           <a:p>
             <a:fld id="{69ADB622-6004-FC41-B12B-9423FD606E5F}" type="datetimeFigureOut">
               <a:rPr lang="en-DE" smtClean="0"/>
-              <a:t>26.04.23</a:t>
+              <a:t>02.05.23</a:t>
             </a:fld>
             <a:endParaRPr lang="en-DE"/>
           </a:p>
@@ -674,7 +1363,7 @@
           <a:p>
             <a:fld id="{69ADB622-6004-FC41-B12B-9423FD606E5F}" type="datetimeFigureOut">
               <a:rPr lang="en-DE" smtClean="0"/>
-              <a:t>26.04.23</a:t>
+              <a:t>02.05.23</a:t>
             </a:fld>
             <a:endParaRPr lang="en-DE"/>
           </a:p>
@@ -874,7 +1563,7 @@
           <a:p>
             <a:fld id="{69ADB622-6004-FC41-B12B-9423FD606E5F}" type="datetimeFigureOut">
               <a:rPr lang="en-DE" smtClean="0"/>
-              <a:t>26.04.23</a:t>
+              <a:t>02.05.23</a:t>
             </a:fld>
             <a:endParaRPr lang="en-DE"/>
           </a:p>
@@ -1150,7 +1839,7 @@
           <a:p>
             <a:fld id="{69ADB622-6004-FC41-B12B-9423FD606E5F}" type="datetimeFigureOut">
               <a:rPr lang="en-DE" smtClean="0"/>
-              <a:t>26.04.23</a:t>
+              <a:t>02.05.23</a:t>
             </a:fld>
             <a:endParaRPr lang="en-DE"/>
           </a:p>
@@ -1418,7 +2107,7 @@
           <a:p>
             <a:fld id="{69ADB622-6004-FC41-B12B-9423FD606E5F}" type="datetimeFigureOut">
               <a:rPr lang="en-DE" smtClean="0"/>
-              <a:t>26.04.23</a:t>
+              <a:t>02.05.23</a:t>
             </a:fld>
             <a:endParaRPr lang="en-DE"/>
           </a:p>
@@ -1833,7 +2522,7 @@
           <a:p>
             <a:fld id="{69ADB622-6004-FC41-B12B-9423FD606E5F}" type="datetimeFigureOut">
               <a:rPr lang="en-DE" smtClean="0"/>
-              <a:t>26.04.23</a:t>
+              <a:t>02.05.23</a:t>
             </a:fld>
             <a:endParaRPr lang="en-DE"/>
           </a:p>
@@ -1975,7 +2664,7 @@
           <a:p>
             <a:fld id="{69ADB622-6004-FC41-B12B-9423FD606E5F}" type="datetimeFigureOut">
               <a:rPr lang="en-DE" smtClean="0"/>
-              <a:t>26.04.23</a:t>
+              <a:t>02.05.23</a:t>
             </a:fld>
             <a:endParaRPr lang="en-DE"/>
           </a:p>
@@ -2088,7 +2777,7 @@
           <a:p>
             <a:fld id="{69ADB622-6004-FC41-B12B-9423FD606E5F}" type="datetimeFigureOut">
               <a:rPr lang="en-DE" smtClean="0"/>
-              <a:t>26.04.23</a:t>
+              <a:t>02.05.23</a:t>
             </a:fld>
             <a:endParaRPr lang="en-DE"/>
           </a:p>
@@ -2401,7 +3090,7 @@
           <a:p>
             <a:fld id="{69ADB622-6004-FC41-B12B-9423FD606E5F}" type="datetimeFigureOut">
               <a:rPr lang="en-DE" smtClean="0"/>
-              <a:t>26.04.23</a:t>
+              <a:t>02.05.23</a:t>
             </a:fld>
             <a:endParaRPr lang="en-DE"/>
           </a:p>
@@ -2690,7 +3379,7 @@
           <a:p>
             <a:fld id="{69ADB622-6004-FC41-B12B-9423FD606E5F}" type="datetimeFigureOut">
               <a:rPr lang="en-DE" smtClean="0"/>
-              <a:t>26.04.23</a:t>
+              <a:t>02.05.23</a:t>
             </a:fld>
             <a:endParaRPr lang="en-DE"/>
           </a:p>
@@ -2933,7 +3622,7 @@
           <a:p>
             <a:fld id="{69ADB622-6004-FC41-B12B-9423FD606E5F}" type="datetimeFigureOut">
               <a:rPr lang="en-DE" smtClean="0"/>
-              <a:t>26.04.23</a:t>
+              <a:t>02.05.23</a:t>
             </a:fld>
             <a:endParaRPr lang="en-DE"/>
           </a:p>
@@ -3420,7 +4109,7 @@
           <p:nvPr/>
         </p:nvPicPr>
         <p:blipFill>
-          <a:blip r:embed="rId2"/>
+          <a:blip r:embed="rId3"/>
           <a:stretch>
             <a:fillRect/>
           </a:stretch>
@@ -5783,7 +6472,7 @@
         </p:nvSpPr>
         <p:spPr>
           <a:xfrm>
-            <a:off x="-198067" y="-237861"/>
+            <a:off x="-208006" y="-237861"/>
             <a:ext cx="13023352" cy="7565501"/>
           </a:xfrm>
           <a:prstGeom prst="rect">
@@ -5839,7 +6528,7 @@
           <p:nvPr/>
         </p:nvPicPr>
         <p:blipFill>
-          <a:blip r:embed="rId2"/>
+          <a:blip r:embed="rId3"/>
           <a:stretch>
             <a:fillRect/>
           </a:stretch>
@@ -7113,6 +7802,52 @@
               </a:rPr>
               <a:t>File</a:t>
             </a:r>
+          </a:p>
+        </p:txBody>
+      </p:sp>
+      <p:sp>
+        <p:nvSpPr>
+          <p:cNvPr id="8" name="TextBox 7">
+            <a:extLst>
+              <a:ext uri="{FF2B5EF4-FFF2-40B4-BE49-F238E27FC236}">
+                <a16:creationId xmlns:a16="http://schemas.microsoft.com/office/drawing/2014/main" id="{29DD7F2B-428E-AC8A-D88E-325153928247}"/>
+              </a:ext>
+            </a:extLst>
+          </p:cNvPr>
+          <p:cNvSpPr txBox="1"/>
+          <p:nvPr/>
+        </p:nvSpPr>
+        <p:spPr>
+          <a:xfrm>
+            <a:off x="870183" y="2498361"/>
+            <a:ext cx="616241" cy="523220"/>
+          </a:xfrm>
+          <a:prstGeom prst="rect">
+            <a:avLst/>
+          </a:prstGeom>
+          <a:noFill/>
+        </p:spPr>
+        <p:txBody>
+          <a:bodyPr wrap="square" rtlCol="0">
+            <a:spAutoFit/>
+          </a:bodyPr>
+          <a:lstStyle/>
+          <a:p>
+            <a:pPr algn="ctr"/>
+            <a:r>
+              <a:rPr lang="en-DE" sz="2800" dirty="0">
+                <a:solidFill>
+                  <a:schemeClr val="accent6"/>
+                </a:solidFill>
+                <a:sym typeface="Wingdings" pitchFamily="2" charset="2"/>
+              </a:rPr>
+              <a:t></a:t>
+            </a:r>
+            <a:endParaRPr lang="en-DE" sz="2800" dirty="0">
+              <a:solidFill>
+                <a:schemeClr val="accent6"/>
+              </a:solidFill>
+            </a:endParaRPr>
           </a:p>
         </p:txBody>
       </p:sp>
@@ -7219,7 +7954,7 @@
           <p:nvPr/>
         </p:nvPicPr>
         <p:blipFill>
-          <a:blip r:embed="rId2"/>
+          <a:blip r:embed="rId3"/>
           <a:stretch>
             <a:fillRect/>
           </a:stretch>
@@ -9271,8 +10006,8 @@
         </p:nvSpPr>
         <p:spPr>
           <a:xfrm>
-            <a:off x="-664630" y="0"/>
-            <a:ext cx="13023352" cy="7565501"/>
+            <a:off x="-664630" y="-438150"/>
+            <a:ext cx="13023352" cy="8003651"/>
           </a:xfrm>
           <a:prstGeom prst="rect">
             <a:avLst/>
@@ -9331,7 +10066,7 @@
           <p:nvPr/>
         </p:nvPicPr>
         <p:blipFill>
-          <a:blip r:embed="rId2"/>
+          <a:blip r:embed="rId3"/>
           <a:stretch>
             <a:fillRect/>
           </a:stretch>
@@ -10725,4 +11460,299 @@
     </a:ext>
   </a:extLst>
 </a:theme>
+</file>
+
+<file path=ppt/theme/theme2.xml><?xml version="1.0" encoding="utf-8"?>
+<a:theme xmlns:a="http://schemas.openxmlformats.org/drawingml/2006/main" name="Office Theme">
+  <a:themeElements>
+    <a:clrScheme name="Office">
+      <a:dk1>
+        <a:sysClr val="windowText" lastClr="000000"/>
+      </a:dk1>
+      <a:lt1>
+        <a:sysClr val="window" lastClr="FFFFFF"/>
+      </a:lt1>
+      <a:dk2>
+        <a:srgbClr val="44546A"/>
+      </a:dk2>
+      <a:lt2>
+        <a:srgbClr val="E7E6E6"/>
+      </a:lt2>
+      <a:accent1>
+        <a:srgbClr val="4472C4"/>
+      </a:accent1>
+      <a:accent2>
+        <a:srgbClr val="ED7D31"/>
+      </a:accent2>
+      <a:accent3>
+        <a:srgbClr val="A5A5A5"/>
+      </a:accent3>
+      <a:accent4>
+        <a:srgbClr val="FFC000"/>
+      </a:accent4>
+      <a:accent5>
+        <a:srgbClr val="5B9BD5"/>
+      </a:accent5>
+      <a:accent6>
+        <a:srgbClr val="70AD47"/>
+      </a:accent6>
+      <a:hlink>
+        <a:srgbClr val="0563C1"/>
+      </a:hlink>
+      <a:folHlink>
+        <a:srgbClr val="954F72"/>
+      </a:folHlink>
+    </a:clrScheme>
+    <a:fontScheme name="Office">
+      <a:majorFont>
+        <a:latin typeface="Calibri Light" panose="020F0302020204030204"/>
+        <a:ea typeface=""/>
+        <a:cs typeface=""/>
+        <a:font script="Jpan" typeface="游ゴシック Light"/>
+        <a:font script="Hang" typeface="맑은 고딕"/>
+        <a:font script="Hans" typeface="等线 Light"/>
+        <a:font script="Hant" typeface="新細明體"/>
+        <a:font script="Arab" typeface="Times New Roman"/>
+        <a:font script="Hebr" typeface="Times New Roman"/>
+        <a:font script="Thai" typeface="Angsana New"/>
+        <a:font script="Ethi" typeface="Nyala"/>
+        <a:font script="Beng" typeface="Vrinda"/>
+        <a:font script="Gujr" typeface="Shruti"/>
+        <a:font script="Khmr" typeface="MoolBoran"/>
+        <a:font script="Knda" typeface="Tunga"/>
+        <a:font script="Guru" typeface="Raavi"/>
+        <a:font script="Cans" typeface="Euphemia"/>
+        <a:font script="Cher" typeface="Plantagenet Cherokee"/>
+        <a:font script="Yiii" typeface="Microsoft Yi Baiti"/>
+        <a:font script="Tibt" typeface="Microsoft Himalaya"/>
+        <a:font script="Thaa" typeface="MV Boli"/>
+        <a:font script="Deva" typeface="Mangal"/>
+        <a:font script="Telu" typeface="Gautami"/>
+        <a:font script="Taml" typeface="Latha"/>
+        <a:font script="Syrc" typeface="Estrangelo Edessa"/>
+        <a:font script="Orya" typeface="Kalinga"/>
+        <a:font script="Mlym" typeface="Kartika"/>
+        <a:font script="Laoo" typeface="DokChampa"/>
+        <a:font script="Sinh" typeface="Iskoola Pota"/>
+        <a:font script="Mong" typeface="Mongolian Baiti"/>
+        <a:font script="Viet" typeface="Times New Roman"/>
+        <a:font script="Uigh" typeface="Microsoft Uighur"/>
+        <a:font script="Geor" typeface="Sylfaen"/>
+        <a:font script="Armn" typeface="Arial"/>
+        <a:font script="Bugi" typeface="Leelawadee UI"/>
+        <a:font script="Bopo" typeface="Microsoft JhengHei"/>
+        <a:font script="Java" typeface="Javanese Text"/>
+        <a:font script="Lisu" typeface="Segoe UI"/>
+        <a:font script="Mymr" typeface="Myanmar Text"/>
+        <a:font script="Nkoo" typeface="Ebrima"/>
+        <a:font script="Olck" typeface="Nirmala UI"/>
+        <a:font script="Osma" typeface="Ebrima"/>
+        <a:font script="Phag" typeface="Phagspa"/>
+        <a:font script="Syrn" typeface="Estrangelo Edessa"/>
+        <a:font script="Syrj" typeface="Estrangelo Edessa"/>
+        <a:font script="Syre" typeface="Estrangelo Edessa"/>
+        <a:font script="Sora" typeface="Nirmala UI"/>
+        <a:font script="Tale" typeface="Microsoft Tai Le"/>
+        <a:font script="Talu" typeface="Microsoft New Tai Lue"/>
+        <a:font script="Tfng" typeface="Ebrima"/>
+      </a:majorFont>
+      <a:minorFont>
+        <a:latin typeface="Calibri" panose="020F0502020204030204"/>
+        <a:ea typeface=""/>
+        <a:cs typeface=""/>
+        <a:font script="Jpan" typeface="游ゴシック"/>
+        <a:font script="Hang" typeface="맑은 고딕"/>
+        <a:font script="Hans" typeface="等线"/>
+        <a:font script="Hant" typeface="新細明體"/>
+        <a:font script="Arab" typeface="Arial"/>
+        <a:font script="Hebr" typeface="Arial"/>
+        <a:font script="Thai" typeface="Cordia New"/>
+        <a:font script="Ethi" typeface="Nyala"/>
+        <a:font script="Beng" typeface="Vrinda"/>
+        <a:font script="Gujr" typeface="Shruti"/>
+        <a:font script="Khmr" typeface="DaunPenh"/>
+        <a:font script="Knda" typeface="Tunga"/>
+        <a:font script="Guru" typeface="Raavi"/>
+        <a:font script="Cans" typeface="Euphemia"/>
+        <a:font script="Cher" typeface="Plantagenet Cherokee"/>
+        <a:font script="Yiii" typeface="Microsoft Yi Baiti"/>
+        <a:font script="Tibt" typeface="Microsoft Himalaya"/>
+        <a:font script="Thaa" typeface="MV Boli"/>
+        <a:font script="Deva" typeface="Mangal"/>
+        <a:font script="Telu" typeface="Gautami"/>
+        <a:font script="Taml" typeface="Latha"/>
+        <a:font script="Syrc" typeface="Estrangelo Edessa"/>
+        <a:font script="Orya" typeface="Kalinga"/>
+        <a:font script="Mlym" typeface="Kartika"/>
+        <a:font script="Laoo" typeface="DokChampa"/>
+        <a:font script="Sinh" typeface="Iskoola Pota"/>
+        <a:font script="Mong" typeface="Mongolian Baiti"/>
+        <a:font script="Viet" typeface="Arial"/>
+        <a:font script="Uigh" typeface="Microsoft Uighur"/>
+        <a:font script="Geor" typeface="Sylfaen"/>
+        <a:font script="Armn" typeface="Arial"/>
+        <a:font script="Bugi" typeface="Leelawadee UI"/>
+        <a:font script="Bopo" typeface="Microsoft JhengHei"/>
+        <a:font script="Java" typeface="Javanese Text"/>
+        <a:font script="Lisu" typeface="Segoe UI"/>
+        <a:font script="Mymr" typeface="Myanmar Text"/>
+        <a:font script="Nkoo" typeface="Ebrima"/>
+        <a:font script="Olck" typeface="Nirmala UI"/>
+        <a:font script="Osma" typeface="Ebrima"/>
+        <a:font script="Phag" typeface="Phagspa"/>
+        <a:font script="Syrn" typeface="Estrangelo Edessa"/>
+        <a:font script="Syrj" typeface="Estrangelo Edessa"/>
+        <a:font script="Syre" typeface="Estrangelo Edessa"/>
+        <a:font script="Sora" typeface="Nirmala UI"/>
+        <a:font script="Tale" typeface="Microsoft Tai Le"/>
+        <a:font script="Talu" typeface="Microsoft New Tai Lue"/>
+        <a:font script="Tfng" typeface="Ebrima"/>
+      </a:minorFont>
+    </a:fontScheme>
+    <a:fmtScheme name="Office">
+      <a:fillStyleLst>
+        <a:solidFill>
+          <a:schemeClr val="phClr"/>
+        </a:solidFill>
+        <a:gradFill rotWithShape="1">
+          <a:gsLst>
+            <a:gs pos="0">
+              <a:schemeClr val="phClr">
+                <a:lumMod val="110000"/>
+                <a:satMod val="105000"/>
+                <a:tint val="67000"/>
+              </a:schemeClr>
+            </a:gs>
+            <a:gs pos="50000">
+              <a:schemeClr val="phClr">
+                <a:lumMod val="105000"/>
+                <a:satMod val="103000"/>
+                <a:tint val="73000"/>
+              </a:schemeClr>
+            </a:gs>
+            <a:gs pos="100000">
+              <a:schemeClr val="phClr">
+                <a:lumMod val="105000"/>
+                <a:satMod val="109000"/>
+                <a:tint val="81000"/>
+              </a:schemeClr>
+            </a:gs>
+          </a:gsLst>
+          <a:lin ang="5400000" scaled="0"/>
+        </a:gradFill>
+        <a:gradFill rotWithShape="1">
+          <a:gsLst>
+            <a:gs pos="0">
+              <a:schemeClr val="phClr">
+                <a:satMod val="103000"/>
+                <a:lumMod val="102000"/>
+                <a:tint val="94000"/>
+              </a:schemeClr>
+            </a:gs>
+            <a:gs pos="50000">
+              <a:schemeClr val="phClr">
+                <a:satMod val="110000"/>
+                <a:lumMod val="100000"/>
+                <a:shade val="100000"/>
+              </a:schemeClr>
+            </a:gs>
+            <a:gs pos="100000">
+              <a:schemeClr val="phClr">
+                <a:lumMod val="99000"/>
+                <a:satMod val="120000"/>
+                <a:shade val="78000"/>
+              </a:schemeClr>
+            </a:gs>
+          </a:gsLst>
+          <a:lin ang="5400000" scaled="0"/>
+        </a:gradFill>
+      </a:fillStyleLst>
+      <a:lnStyleLst>
+        <a:ln w="6350" cap="flat" cmpd="sng" algn="ctr">
+          <a:solidFill>
+            <a:schemeClr val="phClr"/>
+          </a:solidFill>
+          <a:prstDash val="solid"/>
+          <a:miter lim="800000"/>
+        </a:ln>
+        <a:ln w="12700" cap="flat" cmpd="sng" algn="ctr">
+          <a:solidFill>
+            <a:schemeClr val="phClr"/>
+          </a:solidFill>
+          <a:prstDash val="solid"/>
+          <a:miter lim="800000"/>
+        </a:ln>
+        <a:ln w="19050" cap="flat" cmpd="sng" algn="ctr">
+          <a:solidFill>
+            <a:schemeClr val="phClr"/>
+          </a:solidFill>
+          <a:prstDash val="solid"/>
+          <a:miter lim="800000"/>
+        </a:ln>
+      </a:lnStyleLst>
+      <a:effectStyleLst>
+        <a:effectStyle>
+          <a:effectLst/>
+        </a:effectStyle>
+        <a:effectStyle>
+          <a:effectLst/>
+        </a:effectStyle>
+        <a:effectStyle>
+          <a:effectLst>
+            <a:outerShdw blurRad="57150" dist="19050" dir="5400000" algn="ctr" rotWithShape="0">
+              <a:srgbClr val="000000">
+                <a:alpha val="63000"/>
+              </a:srgbClr>
+            </a:outerShdw>
+          </a:effectLst>
+        </a:effectStyle>
+      </a:effectStyleLst>
+      <a:bgFillStyleLst>
+        <a:solidFill>
+          <a:schemeClr val="phClr"/>
+        </a:solidFill>
+        <a:solidFill>
+          <a:schemeClr val="phClr">
+            <a:tint val="95000"/>
+            <a:satMod val="170000"/>
+          </a:schemeClr>
+        </a:solidFill>
+        <a:gradFill rotWithShape="1">
+          <a:gsLst>
+            <a:gs pos="0">
+              <a:schemeClr val="phClr">
+                <a:tint val="93000"/>
+                <a:satMod val="150000"/>
+                <a:shade val="98000"/>
+                <a:lumMod val="102000"/>
+              </a:schemeClr>
+            </a:gs>
+            <a:gs pos="50000">
+              <a:schemeClr val="phClr">
+                <a:tint val="98000"/>
+                <a:satMod val="130000"/>
+                <a:shade val="90000"/>
+                <a:lumMod val="103000"/>
+              </a:schemeClr>
+            </a:gs>
+            <a:gs pos="100000">
+              <a:schemeClr val="phClr">
+                <a:shade val="63000"/>
+                <a:satMod val="120000"/>
+              </a:schemeClr>
+            </a:gs>
+          </a:gsLst>
+          <a:lin ang="5400000" scaled="0"/>
+        </a:gradFill>
+      </a:bgFillStyleLst>
+    </a:fmtScheme>
+  </a:themeElements>
+  <a:objectDefaults/>
+  <a:extraClrSchemeLst/>
+  <a:extLst>
+    <a:ext uri="{05A4C25C-085E-4340-85A3-A5531E510DB2}">
+      <thm15:themeFamily xmlns:thm15="http://schemas.microsoft.com/office/thememl/2012/main" name="Office Theme" id="{62F939B6-93AF-4DB8-9C6B-D6C7DFDC589F}" vid="{4A3C46E8-61CC-4603-A589-7422A47A8E4A}"/>
+    </a:ext>
+  </a:extLst>
+</a:theme>
 </file>
</xml_diff>